<commit_message>
add more installation in presentation
</commit_message>
<xml_diff>
--- a/document/presentation.pptx
+++ b/document/presentation.pptx
@@ -9,6 +9,9 @@
     <p:sldId id="257" r:id="rId3"/>
     <p:sldId id="258" r:id="rId4"/>
     <p:sldId id="259" r:id="rId5"/>
+    <p:sldId id="260" r:id="rId6"/>
+    <p:sldId id="261" r:id="rId7"/>
+    <p:sldId id="262" r:id="rId8"/>
   </p:sldIdLst>
   <p:sldSz cx="12192000" cy="6858000"/>
   <p:notesSz cx="6858000" cy="9144000"/>
@@ -107,6 +110,11 @@
       </a:defRPr>
     </a:lvl9pPr>
   </p:defaultTextStyle>
+  <p:extLst>
+    <p:ext uri="{EFAFB233-063F-42B5-8137-9DF3F51BA10A}">
+      <p15:sldGuideLst xmlns:p15="http://schemas.microsoft.com/office/powerpoint/2012/main"/>
+    </p:ext>
+  </p:extLst>
 </p:presentation>
 </file>
 
@@ -884,7 +892,7 @@
             <a:defRPr cap="all"/>
           </a:pPr>
           <a:r>
-            <a:rPr lang="en-US"/>
+            <a:rPr lang="en-US" dirty="0"/>
             <a:t>Spring Tool</a:t>
           </a:r>
         </a:p>
@@ -962,7 +970,7 @@
             <a:defRPr cap="all"/>
           </a:pPr>
           <a:r>
-            <a:rPr lang="en-US"/>
+            <a:rPr lang="en-US" dirty="0"/>
             <a:t>MySQL (Database)</a:t>
           </a:r>
         </a:p>
@@ -1040,7 +1048,7 @@
             <a:defRPr cap="all"/>
           </a:pPr>
           <a:r>
-            <a:rPr lang="en-US"/>
+            <a:rPr lang="en-US" dirty="0"/>
             <a:t>Postman</a:t>
           </a:r>
         </a:p>
@@ -1683,7 +1691,7 @@
             <a:defRPr cap="all"/>
           </a:pPr>
           <a:r>
-            <a:rPr lang="en-US" sz="1500" kern="1200"/>
+            <a:rPr lang="en-US" sz="1500" kern="1200" dirty="0"/>
             <a:t>Spring Tool</a:t>
           </a:r>
         </a:p>
@@ -1987,7 +1995,7 @@
             <a:defRPr cap="all"/>
           </a:pPr>
           <a:r>
-            <a:rPr lang="en-US" sz="1500" kern="1200"/>
+            <a:rPr lang="en-US" sz="1500" kern="1200" dirty="0"/>
             <a:t>MySQL (Database)</a:t>
           </a:r>
         </a:p>
@@ -2291,7 +2299,7 @@
             <a:defRPr cap="all"/>
           </a:pPr>
           <a:r>
-            <a:rPr lang="en-US" sz="1500" kern="1200"/>
+            <a:rPr lang="en-US" sz="1500" kern="1200" dirty="0"/>
             <a:t>Postman</a:t>
           </a:r>
         </a:p>
@@ -4187,7 +4195,7 @@
           <a:p>
             <a:fld id="{EA0C0817-A112-4847-8014-A94B7D2A4EA3}" type="datetime1">
               <a:rPr lang="en-US" smtClean="0"/>
-              <a:t>8/15/2019</a:t>
+              <a:t>8/17/2019</a:t>
             </a:fld>
             <a:endParaRPr lang="en-US" dirty="0"/>
           </a:p>
@@ -4389,7 +4397,7 @@
           <a:p>
             <a:fld id="{134F40B7-36AB-4376-BE14-EF7004D79BB9}" type="datetime1">
               <a:rPr lang="en-US" smtClean="0"/>
-              <a:t>8/15/2019</a:t>
+              <a:t>8/17/2019</a:t>
             </a:fld>
             <a:endParaRPr lang="en-US"/>
           </a:p>
@@ -4569,7 +4577,7 @@
           <a:p>
             <a:fld id="{FF87CAB8-DCAE-46A5-AADA-B3FAD11A54E0}" type="datetime1">
               <a:rPr lang="en-US" smtClean="0"/>
-              <a:t>8/15/2019</a:t>
+              <a:t>8/17/2019</a:t>
             </a:fld>
             <a:endParaRPr lang="en-US"/>
           </a:p>
@@ -4739,7 +4747,7 @@
           <a:p>
             <a:fld id="{7332B432-ACDA-4023-A761-2BAB76577B62}" type="datetime1">
               <a:rPr lang="en-US" smtClean="0"/>
-              <a:t>8/15/2019</a:t>
+              <a:t>8/17/2019</a:t>
             </a:fld>
             <a:endParaRPr lang="en-US"/>
           </a:p>
@@ -5338,7 +5346,7 @@
           <a:p>
             <a:fld id="{D9C646AA-F36E-4540-911D-FFFC0A0EF24A}" type="datetime1">
               <a:rPr lang="en-US" smtClean="0"/>
-              <a:t>8/15/2019</a:t>
+              <a:t>8/17/2019</a:t>
             </a:fld>
             <a:endParaRPr lang="en-US" dirty="0"/>
           </a:p>
@@ -5658,7 +5666,7 @@
           <a:p>
             <a:fld id="{69186D26-FA5F-4637-B602-B7C2DC34CFD4}" type="datetime1">
               <a:rPr lang="en-US" smtClean="0"/>
-              <a:t>8/15/2019</a:t>
+              <a:t>8/17/2019</a:t>
             </a:fld>
             <a:endParaRPr lang="en-US"/>
           </a:p>
@@ -6093,7 +6101,7 @@
           <a:p>
             <a:fld id="{8A7F15D8-96D1-4781-BC50-CA8A088B2FE4}" type="datetime1">
               <a:rPr lang="en-US" smtClean="0"/>
-              <a:t>8/15/2019</a:t>
+              <a:t>8/17/2019</a:t>
             </a:fld>
             <a:endParaRPr lang="en-US"/>
           </a:p>
@@ -6211,7 +6219,7 @@
           <a:p>
             <a:fld id="{F9A96C99-B8F8-4528-BD05-0E16E943DC09}" type="datetime1">
               <a:rPr lang="en-US" smtClean="0"/>
-              <a:t>8/15/2019</a:t>
+              <a:t>8/17/2019</a:t>
             </a:fld>
             <a:endParaRPr lang="en-US"/>
           </a:p>
@@ -6306,7 +6314,7 @@
           <a:p>
             <a:fld id="{03636942-C211-4B28-8DBD-C953E00AF71B}" type="datetime1">
               <a:rPr lang="en-US" smtClean="0"/>
-              <a:t>8/15/2019</a:t>
+              <a:t>8/17/2019</a:t>
             </a:fld>
             <a:endParaRPr lang="en-US"/>
           </a:p>
@@ -6723,7 +6731,7 @@
           <a:p>
             <a:fld id="{7E8D12A6-918A-48BD-8CB9-CA713993B0EA}" type="datetime1">
               <a:rPr lang="en-US" smtClean="0"/>
-              <a:t>8/15/2019</a:t>
+              <a:t>8/17/2019</a:t>
             </a:fld>
             <a:endParaRPr lang="en-US"/>
           </a:p>
@@ -6985,7 +6993,7 @@
             <a:fld id="{E778CE86-875F-4587-BCF6-FA054AFC0D53}" type="datetime1">
               <a:rPr lang="en-US" smtClean="0"/>
               <a:pPr/>
-              <a:t>8/15/2019</a:t>
+              <a:t>8/17/2019</a:t>
             </a:fld>
             <a:endParaRPr lang="en-US" dirty="0"/>
           </a:p>
@@ -7501,7 +7509,7 @@
           <a:p>
             <a:fld id="{F6FA2B21-3FCD-4721-B95C-427943F61125}" type="datetime1">
               <a:rPr lang="en-US" smtClean="0"/>
-              <a:t>8/15/2019</a:t>
+              <a:t>8/17/2019</a:t>
             </a:fld>
             <a:endParaRPr lang="en-US"/>
           </a:p>
@@ -8379,6 +8387,14 @@
 <file path=ppt/slides/slide3.xml><?xml version="1.0" encoding="utf-8"?>
 <p:sld xmlns:a="http://schemas.openxmlformats.org/drawingml/2006/main" xmlns:r="http://schemas.openxmlformats.org/officeDocument/2006/relationships" xmlns:p="http://schemas.openxmlformats.org/presentationml/2006/main">
   <p:cSld>
+    <p:bg>
+      <p:bgPr>
+        <a:solidFill>
+          <a:schemeClr val="bg1"/>
+        </a:solidFill>
+        <a:effectLst/>
+      </p:bgPr>
+    </p:bg>
     <p:spTree>
       <p:nvGrpSpPr>
         <p:cNvPr id="1" name=""/>
@@ -8395,6 +8411,190 @@
       </p:grpSpPr>
       <p:sp>
         <p:nvSpPr>
+          <p:cNvPr id="10" name="Rectangle 9">
+            <a:extLst>
+              <a:ext uri="{FF2B5EF4-FFF2-40B4-BE49-F238E27FC236}">
+                <a16:creationId xmlns:a16="http://schemas.microsoft.com/office/drawing/2014/main" id="{282E2A95-1A08-4118-83C6-B1CA5648E075}"/>
+              </a:ext>
+              <a:ext uri="{C183D7F6-B498-43B3-948B-1728B52AA6E4}">
+                <adec:decorative xmlns:adec="http://schemas.microsoft.com/office/drawing/2017/decorative" val="1"/>
+              </a:ext>
+            </a:extLst>
+          </p:cNvPr>
+          <p:cNvSpPr>
+            <a:spLocks noGrp="1" noRot="1" noChangeAspect="1" noMove="1" noResize="1" noEditPoints="1" noAdjustHandles="1" noChangeArrowheads="1" noChangeShapeType="1" noTextEdit="1"/>
+          </p:cNvSpPr>
+          <p:nvPr>
+            <p:extLst>
+              <p:ext uri="{386F3935-93C4-4BCD-93E2-E3B085C9AB24}">
+                <p16:designElem xmlns:p16="http://schemas.microsoft.com/office/powerpoint/2015/main" val="1"/>
+              </p:ext>
+            </p:extLst>
+          </p:nvPr>
+        </p:nvSpPr>
+        <p:spPr>
+          <a:xfrm>
+            <a:off x="0" y="0"/>
+            <a:ext cx="12192000" cy="6858000"/>
+          </a:xfrm>
+          <a:prstGeom prst="rect">
+            <a:avLst/>
+          </a:prstGeom>
+          <a:ln>
+            <a:noFill/>
+          </a:ln>
+        </p:spPr>
+        <p:style>
+          <a:lnRef idx="2">
+            <a:schemeClr val="accent1">
+              <a:shade val="50000"/>
+            </a:schemeClr>
+          </a:lnRef>
+          <a:fillRef idx="1001">
+            <a:schemeClr val="lt1"/>
+          </a:fillRef>
+          <a:effectRef idx="0">
+            <a:schemeClr val="accent1"/>
+          </a:effectRef>
+          <a:fontRef idx="minor">
+            <a:schemeClr val="lt1"/>
+          </a:fontRef>
+        </p:style>
+        <p:txBody>
+          <a:bodyPr rtlCol="0" anchor="ctr"/>
+          <a:lstStyle/>
+          <a:p>
+            <a:pPr algn="ctr"/>
+            <a:endParaRPr lang="en-US"/>
+          </a:p>
+        </p:txBody>
+      </p:sp>
+      <p:sp>
+        <p:nvSpPr>
+          <p:cNvPr id="12" name="Rectangle 11">
+            <a:extLst>
+              <a:ext uri="{FF2B5EF4-FFF2-40B4-BE49-F238E27FC236}">
+                <a16:creationId xmlns:a16="http://schemas.microsoft.com/office/drawing/2014/main" id="{2FFEFC7E-85EE-4AC9-A351-FBEB13A1D622}"/>
+              </a:ext>
+              <a:ext uri="{C183D7F6-B498-43B3-948B-1728B52AA6E4}">
+                <adec:decorative xmlns:adec="http://schemas.microsoft.com/office/drawing/2017/decorative" val="1"/>
+              </a:ext>
+            </a:extLst>
+          </p:cNvPr>
+          <p:cNvSpPr>
+            <a:spLocks noGrp="1" noRot="1" noChangeAspect="1" noMove="1" noResize="1" noEditPoints="1" noAdjustHandles="1" noChangeArrowheads="1" noChangeShapeType="1" noTextEdit="1"/>
+          </p:cNvSpPr>
+          <p:nvPr>
+            <p:extLst>
+              <p:ext uri="{386F3935-93C4-4BCD-93E2-E3B085C9AB24}">
+                <p16:designElem xmlns:p16="http://schemas.microsoft.com/office/powerpoint/2015/main" val="1"/>
+              </p:ext>
+            </p:extLst>
+          </p:nvPr>
+        </p:nvSpPr>
+        <p:spPr>
+          <a:xfrm>
+            <a:off x="245534" y="237744"/>
+            <a:ext cx="2926080" cy="6382512"/>
+          </a:xfrm>
+          <a:prstGeom prst="rect">
+            <a:avLst/>
+          </a:prstGeom>
+          <a:solidFill>
+            <a:schemeClr val="bg1">
+              <a:lumMod val="75000"/>
+              <a:lumOff val="25000"/>
+            </a:schemeClr>
+          </a:solidFill>
+          <a:ln>
+            <a:noFill/>
+          </a:ln>
+        </p:spPr>
+        <p:style>
+          <a:lnRef idx="2">
+            <a:schemeClr val="accent1">
+              <a:shade val="50000"/>
+            </a:schemeClr>
+          </a:lnRef>
+          <a:fillRef idx="1">
+            <a:schemeClr val="accent1"/>
+          </a:fillRef>
+          <a:effectRef idx="0">
+            <a:schemeClr val="accent1"/>
+          </a:effectRef>
+          <a:fontRef idx="minor">
+            <a:schemeClr val="lt1"/>
+          </a:fontRef>
+        </p:style>
+      </p:sp>
+      <p:sp>
+        <p:nvSpPr>
+          <p:cNvPr id="14" name="Rectangle 13">
+            <a:extLst>
+              <a:ext uri="{FF2B5EF4-FFF2-40B4-BE49-F238E27FC236}">
+                <a16:creationId xmlns:a16="http://schemas.microsoft.com/office/drawing/2014/main" id="{CB2511BB-FC4C-45F3-94EB-661D6806C942}"/>
+              </a:ext>
+              <a:ext uri="{C183D7F6-B498-43B3-948B-1728B52AA6E4}">
+                <adec:decorative xmlns:adec="http://schemas.microsoft.com/office/drawing/2017/decorative" val="1"/>
+              </a:ext>
+            </a:extLst>
+          </p:cNvPr>
+          <p:cNvSpPr>
+            <a:spLocks noGrp="1" noRot="1" noChangeAspect="1" noMove="1" noResize="1" noEditPoints="1" noAdjustHandles="1" noChangeArrowheads="1" noChangeShapeType="1" noTextEdit="1"/>
+          </p:cNvSpPr>
+          <p:nvPr>
+            <p:extLst>
+              <p:ext uri="{386F3935-93C4-4BCD-93E2-E3B085C9AB24}">
+                <p16:designElem xmlns:p16="http://schemas.microsoft.com/office/powerpoint/2015/main" val="1"/>
+              </p:ext>
+            </p:extLst>
+          </p:nvPr>
+        </p:nvSpPr>
+        <p:spPr>
+          <a:xfrm>
+            <a:off x="419100" y="413053"/>
+            <a:ext cx="2616201" cy="6064596"/>
+          </a:xfrm>
+          <a:prstGeom prst="rect">
+            <a:avLst/>
+          </a:prstGeom>
+          <a:noFill/>
+          <a:ln w="6350">
+            <a:solidFill>
+              <a:schemeClr val="tx1">
+                <a:lumMod val="75000"/>
+                <a:lumOff val="25000"/>
+              </a:schemeClr>
+            </a:solidFill>
+          </a:ln>
+        </p:spPr>
+        <p:style>
+          <a:lnRef idx="2">
+            <a:schemeClr val="accent1">
+              <a:shade val="50000"/>
+            </a:schemeClr>
+          </a:lnRef>
+          <a:fillRef idx="1">
+            <a:schemeClr val="accent1"/>
+          </a:fillRef>
+          <a:effectRef idx="0">
+            <a:schemeClr val="accent1"/>
+          </a:effectRef>
+          <a:fontRef idx="minor">
+            <a:schemeClr val="lt1"/>
+          </a:fontRef>
+        </p:style>
+        <p:txBody>
+          <a:bodyPr rtlCol="0" anchor="ctr"/>
+          <a:lstStyle/>
+          <a:p>
+            <a:pPr algn="ctr"/>
+            <a:endParaRPr lang="en-US"/>
+          </a:p>
+        </p:txBody>
+      </p:sp>
+      <p:sp>
+        <p:nvSpPr>
           <p:cNvPr id="2" name="Title 1">
             <a:extLst>
               <a:ext uri="{FF2B5EF4-FFF2-40B4-BE49-F238E27FC236}">
@@ -8409,13 +8609,20 @@
             <p:ph type="title"/>
           </p:nvPr>
         </p:nvSpPr>
-        <p:spPr/>
+        <p:spPr>
+          <a:xfrm>
+            <a:off x="557720" y="612843"/>
+            <a:ext cx="2312480" cy="1499738"/>
+          </a:xfrm>
+        </p:spPr>
         <p:txBody>
-          <a:bodyPr/>
+          <a:bodyPr anchor="b">
+            <a:normAutofit/>
+          </a:bodyPr>
           <a:lstStyle/>
           <a:p>
             <a:r>
-              <a:rPr lang="en-US" dirty="0"/>
+              <a:rPr lang="en-US" sz="2800"/>
               <a:t>Spring Tool</a:t>
             </a:r>
           </a:p>
@@ -8437,42 +8644,146 @@
             <p:ph idx="1"/>
           </p:nvPr>
         </p:nvSpPr>
-        <p:spPr/>
+        <p:spPr>
+          <a:xfrm>
+            <a:off x="557720" y="2149813"/>
+            <a:ext cx="2312479" cy="3854197"/>
+          </a:xfrm>
+        </p:spPr>
         <p:txBody>
-          <a:bodyPr/>
+          <a:bodyPr>
+            <a:normAutofit/>
+          </a:bodyPr>
           <a:lstStyle/>
           <a:p>
             <a:r>
-              <a:rPr lang="en-US" sz="2800" dirty="0"/>
+              <a:rPr lang="en-US" sz="1400">
+                <a:solidFill>
+                  <a:schemeClr val="tx1">
+                    <a:lumMod val="85000"/>
+                    <a:lumOff val="15000"/>
+                  </a:schemeClr>
+                </a:solidFill>
+              </a:rPr>
               <a:t>Download : </a:t>
             </a:r>
             <a:r>
-              <a:rPr lang="en-US" sz="2800" dirty="0">
+              <a:rPr lang="en-US" sz="1400">
+                <a:solidFill>
+                  <a:schemeClr val="tx1">
+                    <a:lumMod val="85000"/>
+                    <a:lumOff val="15000"/>
+                  </a:schemeClr>
+                </a:solidFill>
                 <a:hlinkClick r:id="rId2"/>
               </a:rPr>
               <a:t>https://spring.io/tools</a:t>
             </a:r>
-            <a:endParaRPr lang="en-US" sz="2800" dirty="0"/>
+            <a:endParaRPr lang="en-US" sz="1400">
+              <a:solidFill>
+                <a:schemeClr val="tx1">
+                  <a:lumMod val="85000"/>
+                  <a:lumOff val="15000"/>
+                </a:schemeClr>
+              </a:solidFill>
+            </a:endParaRPr>
           </a:p>
           <a:p>
             <a:r>
-              <a:rPr lang="th-TH" sz="2800" dirty="0"/>
+              <a:rPr lang="th-TH" sz="1400">
+                <a:solidFill>
+                  <a:schemeClr val="tx1">
+                    <a:lumMod val="85000"/>
+                    <a:lumOff val="15000"/>
+                  </a:schemeClr>
+                </a:solidFill>
+              </a:rPr>
               <a:t>โหลดมาแล้ว </a:t>
             </a:r>
             <a:r>
-              <a:rPr lang="en-US" sz="2800" dirty="0"/>
+              <a:rPr lang="en-US" sz="1400">
+                <a:solidFill>
+                  <a:schemeClr val="tx1">
+                    <a:lumMod val="85000"/>
+                    <a:lumOff val="15000"/>
+                  </a:schemeClr>
+                </a:solidFill>
+              </a:rPr>
               <a:t>Extract File</a:t>
             </a:r>
             <a:r>
-              <a:rPr lang="th-TH" sz="2800" dirty="0"/>
+              <a:rPr lang="th-TH" sz="1400">
+                <a:solidFill>
+                  <a:schemeClr val="tx1">
+                    <a:lumMod val="85000"/>
+                    <a:lumOff val="15000"/>
+                  </a:schemeClr>
+                </a:solidFill>
+              </a:rPr>
               <a:t> และใช้งานได้เลย</a:t>
             </a:r>
-            <a:endParaRPr lang="en-US" sz="2800" dirty="0"/>
-          </a:p>
-          <a:p>
-            <a:endParaRPr lang="en-US" dirty="0"/>
+            <a:endParaRPr lang="en-US" sz="1400">
+              <a:solidFill>
+                <a:schemeClr val="tx1">
+                  <a:lumMod val="85000"/>
+                  <a:lumOff val="15000"/>
+                </a:schemeClr>
+              </a:solidFill>
+            </a:endParaRPr>
+          </a:p>
+          <a:p>
+            <a:endParaRPr lang="en-US" sz="1400">
+              <a:solidFill>
+                <a:schemeClr val="tx1">
+                  <a:lumMod val="85000"/>
+                  <a:lumOff val="15000"/>
+                </a:schemeClr>
+              </a:solidFill>
+            </a:endParaRPr>
           </a:p>
         </p:txBody>
+      </p:sp>
+      <p:sp>
+        <p:nvSpPr>
+          <p:cNvPr id="16" name="Rectangle 15">
+            <a:extLst>
+              <a:ext uri="{FF2B5EF4-FFF2-40B4-BE49-F238E27FC236}">
+                <a16:creationId xmlns:a16="http://schemas.microsoft.com/office/drawing/2014/main" id="{68DC0EC7-60EA-4BD3-BC04-D547DE1B2891}"/>
+              </a:ext>
+              <a:ext uri="{C183D7F6-B498-43B3-948B-1728B52AA6E4}">
+                <adec:decorative xmlns:adec="http://schemas.microsoft.com/office/drawing/2017/decorative" val="1"/>
+              </a:ext>
+            </a:extLst>
+          </p:cNvPr>
+          <p:cNvSpPr>
+            <a:spLocks noGrp="1" noRot="1" noChangeAspect="1" noMove="1" noResize="1" noEditPoints="1" noAdjustHandles="1" noChangeArrowheads="1" noChangeShapeType="1" noTextEdit="1"/>
+          </p:cNvSpPr>
+          <p:nvPr>
+            <p:extLst>
+              <p:ext uri="{386F3935-93C4-4BCD-93E2-E3B085C9AB24}">
+                <p16:designElem xmlns:p16="http://schemas.microsoft.com/office/powerpoint/2015/main" val="1"/>
+              </p:ext>
+            </p:extLst>
+          </p:nvPr>
+        </p:nvSpPr>
+        <p:spPr>
+          <a:xfrm>
+            <a:off x="3569764" y="413053"/>
+            <a:ext cx="8212114" cy="6064596"/>
+          </a:xfrm>
+          <a:prstGeom prst="rect">
+            <a:avLst/>
+          </a:prstGeom>
+          <a:noFill/>
+          <a:ln w="6350" cap="sq" cmpd="sng" algn="ctr">
+            <a:solidFill>
+              <a:srgbClr val="404040"/>
+            </a:solidFill>
+            <a:prstDash val="solid"/>
+            <a:miter lim="800000"/>
+          </a:ln>
+          <a:effectLst/>
+        </p:spPr>
       </p:sp>
       <p:pic>
         <p:nvPicPr>
@@ -8501,8 +8812,8 @@
         </p:blipFill>
         <p:spPr>
           <a:xfrm>
-            <a:off x="6515100" y="2103120"/>
-            <a:ext cx="4030175" cy="3257169"/>
+            <a:off x="4168569" y="612843"/>
+            <a:ext cx="7014503" cy="5671612"/>
           </a:xfrm>
           <a:prstGeom prst="rect">
             <a:avLst/>
@@ -8517,7 +8828,7 @@
     </p:extLst>
   </p:cSld>
   <p:clrMapOvr>
-    <a:masterClrMapping/>
+    <a:overrideClrMapping bg1="dk1" tx1="lt1" bg2="dk2" tx2="lt2" accent1="accent1" accent2="accent2" accent3="accent3" accent4="accent4" accent5="accent5" accent6="accent6" hlink="hlink" folHlink="folHlink"/>
   </p:clrMapOvr>
 </p:sld>
 </file>
@@ -8525,6 +8836,14 @@
 <file path=ppt/slides/slide4.xml><?xml version="1.0" encoding="utf-8"?>
 <p:sld xmlns:a="http://schemas.openxmlformats.org/drawingml/2006/main" xmlns:r="http://schemas.openxmlformats.org/officeDocument/2006/relationships" xmlns:p="http://schemas.openxmlformats.org/presentationml/2006/main">
   <p:cSld>
+    <p:bg>
+      <p:bgPr>
+        <a:solidFill>
+          <a:schemeClr val="bg1"/>
+        </a:solidFill>
+        <a:effectLst/>
+      </p:bgPr>
+    </p:bg>
     <p:spTree>
       <p:nvGrpSpPr>
         <p:cNvPr id="1" name=""/>
@@ -8541,6 +8860,190 @@
       </p:grpSpPr>
       <p:sp>
         <p:nvSpPr>
+          <p:cNvPr id="10" name="Rectangle 9">
+            <a:extLst>
+              <a:ext uri="{FF2B5EF4-FFF2-40B4-BE49-F238E27FC236}">
+                <a16:creationId xmlns:a16="http://schemas.microsoft.com/office/drawing/2014/main" id="{282E2A95-1A08-4118-83C6-B1CA5648E075}"/>
+              </a:ext>
+              <a:ext uri="{C183D7F6-B498-43B3-948B-1728B52AA6E4}">
+                <adec:decorative xmlns:adec="http://schemas.microsoft.com/office/drawing/2017/decorative" val="1"/>
+              </a:ext>
+            </a:extLst>
+          </p:cNvPr>
+          <p:cNvSpPr>
+            <a:spLocks noGrp="1" noRot="1" noChangeAspect="1" noMove="1" noResize="1" noEditPoints="1" noAdjustHandles="1" noChangeArrowheads="1" noChangeShapeType="1" noTextEdit="1"/>
+          </p:cNvSpPr>
+          <p:nvPr>
+            <p:extLst>
+              <p:ext uri="{386F3935-93C4-4BCD-93E2-E3B085C9AB24}">
+                <p16:designElem xmlns:p16="http://schemas.microsoft.com/office/powerpoint/2015/main" val="1"/>
+              </p:ext>
+            </p:extLst>
+          </p:nvPr>
+        </p:nvSpPr>
+        <p:spPr>
+          <a:xfrm>
+            <a:off x="0" y="0"/>
+            <a:ext cx="12192000" cy="6858000"/>
+          </a:xfrm>
+          <a:prstGeom prst="rect">
+            <a:avLst/>
+          </a:prstGeom>
+          <a:ln>
+            <a:noFill/>
+          </a:ln>
+        </p:spPr>
+        <p:style>
+          <a:lnRef idx="2">
+            <a:schemeClr val="accent1">
+              <a:shade val="50000"/>
+            </a:schemeClr>
+          </a:lnRef>
+          <a:fillRef idx="1001">
+            <a:schemeClr val="lt1"/>
+          </a:fillRef>
+          <a:effectRef idx="0">
+            <a:schemeClr val="accent1"/>
+          </a:effectRef>
+          <a:fontRef idx="minor">
+            <a:schemeClr val="lt1"/>
+          </a:fontRef>
+        </p:style>
+        <p:txBody>
+          <a:bodyPr rtlCol="0" anchor="ctr"/>
+          <a:lstStyle/>
+          <a:p>
+            <a:pPr algn="ctr"/>
+            <a:endParaRPr lang="en-US"/>
+          </a:p>
+        </p:txBody>
+      </p:sp>
+      <p:sp>
+        <p:nvSpPr>
+          <p:cNvPr id="12" name="Rectangle 11">
+            <a:extLst>
+              <a:ext uri="{FF2B5EF4-FFF2-40B4-BE49-F238E27FC236}">
+                <a16:creationId xmlns:a16="http://schemas.microsoft.com/office/drawing/2014/main" id="{2FFEFC7E-85EE-4AC9-A351-FBEB13A1D622}"/>
+              </a:ext>
+              <a:ext uri="{C183D7F6-B498-43B3-948B-1728B52AA6E4}">
+                <adec:decorative xmlns:adec="http://schemas.microsoft.com/office/drawing/2017/decorative" val="1"/>
+              </a:ext>
+            </a:extLst>
+          </p:cNvPr>
+          <p:cNvSpPr>
+            <a:spLocks noGrp="1" noRot="1" noChangeAspect="1" noMove="1" noResize="1" noEditPoints="1" noAdjustHandles="1" noChangeArrowheads="1" noChangeShapeType="1" noTextEdit="1"/>
+          </p:cNvSpPr>
+          <p:nvPr>
+            <p:extLst>
+              <p:ext uri="{386F3935-93C4-4BCD-93E2-E3B085C9AB24}">
+                <p16:designElem xmlns:p16="http://schemas.microsoft.com/office/powerpoint/2015/main" val="1"/>
+              </p:ext>
+            </p:extLst>
+          </p:nvPr>
+        </p:nvSpPr>
+        <p:spPr>
+          <a:xfrm>
+            <a:off x="245534" y="237744"/>
+            <a:ext cx="2926080" cy="6382512"/>
+          </a:xfrm>
+          <a:prstGeom prst="rect">
+            <a:avLst/>
+          </a:prstGeom>
+          <a:solidFill>
+            <a:schemeClr val="bg1">
+              <a:lumMod val="75000"/>
+              <a:lumOff val="25000"/>
+            </a:schemeClr>
+          </a:solidFill>
+          <a:ln>
+            <a:noFill/>
+          </a:ln>
+        </p:spPr>
+        <p:style>
+          <a:lnRef idx="2">
+            <a:schemeClr val="accent1">
+              <a:shade val="50000"/>
+            </a:schemeClr>
+          </a:lnRef>
+          <a:fillRef idx="1">
+            <a:schemeClr val="accent1"/>
+          </a:fillRef>
+          <a:effectRef idx="0">
+            <a:schemeClr val="accent1"/>
+          </a:effectRef>
+          <a:fontRef idx="minor">
+            <a:schemeClr val="lt1"/>
+          </a:fontRef>
+        </p:style>
+      </p:sp>
+      <p:sp>
+        <p:nvSpPr>
+          <p:cNvPr id="14" name="Rectangle 13">
+            <a:extLst>
+              <a:ext uri="{FF2B5EF4-FFF2-40B4-BE49-F238E27FC236}">
+                <a16:creationId xmlns:a16="http://schemas.microsoft.com/office/drawing/2014/main" id="{CB2511BB-FC4C-45F3-94EB-661D6806C942}"/>
+              </a:ext>
+              <a:ext uri="{C183D7F6-B498-43B3-948B-1728B52AA6E4}">
+                <adec:decorative xmlns:adec="http://schemas.microsoft.com/office/drawing/2017/decorative" val="1"/>
+              </a:ext>
+            </a:extLst>
+          </p:cNvPr>
+          <p:cNvSpPr>
+            <a:spLocks noGrp="1" noRot="1" noChangeAspect="1" noMove="1" noResize="1" noEditPoints="1" noAdjustHandles="1" noChangeArrowheads="1" noChangeShapeType="1" noTextEdit="1"/>
+          </p:cNvSpPr>
+          <p:nvPr>
+            <p:extLst>
+              <p:ext uri="{386F3935-93C4-4BCD-93E2-E3B085C9AB24}">
+                <p16:designElem xmlns:p16="http://schemas.microsoft.com/office/powerpoint/2015/main" val="1"/>
+              </p:ext>
+            </p:extLst>
+          </p:nvPr>
+        </p:nvSpPr>
+        <p:spPr>
+          <a:xfrm>
+            <a:off x="419100" y="413053"/>
+            <a:ext cx="2616201" cy="6064596"/>
+          </a:xfrm>
+          <a:prstGeom prst="rect">
+            <a:avLst/>
+          </a:prstGeom>
+          <a:noFill/>
+          <a:ln w="6350">
+            <a:solidFill>
+              <a:schemeClr val="tx1">
+                <a:lumMod val="75000"/>
+                <a:lumOff val="25000"/>
+              </a:schemeClr>
+            </a:solidFill>
+          </a:ln>
+        </p:spPr>
+        <p:style>
+          <a:lnRef idx="2">
+            <a:schemeClr val="accent1">
+              <a:shade val="50000"/>
+            </a:schemeClr>
+          </a:lnRef>
+          <a:fillRef idx="1">
+            <a:schemeClr val="accent1"/>
+          </a:fillRef>
+          <a:effectRef idx="0">
+            <a:schemeClr val="accent1"/>
+          </a:effectRef>
+          <a:fontRef idx="minor">
+            <a:schemeClr val="lt1"/>
+          </a:fontRef>
+        </p:style>
+        <p:txBody>
+          <a:bodyPr rtlCol="0" anchor="ctr"/>
+          <a:lstStyle/>
+          <a:p>
+            <a:pPr algn="ctr"/>
+            <a:endParaRPr lang="en-US"/>
+          </a:p>
+        </p:txBody>
+      </p:sp>
+      <p:sp>
+        <p:nvSpPr>
           <p:cNvPr id="2" name="Title 1">
             <a:extLst>
               <a:ext uri="{FF2B5EF4-FFF2-40B4-BE49-F238E27FC236}">
@@ -8555,16 +9058,22 @@
             <p:ph type="title"/>
           </p:nvPr>
         </p:nvSpPr>
-        <p:spPr/>
+        <p:spPr>
+          <a:xfrm>
+            <a:off x="557720" y="612843"/>
+            <a:ext cx="2312480" cy="1499738"/>
+          </a:xfrm>
+        </p:spPr>
         <p:txBody>
-          <a:bodyPr/>
+          <a:bodyPr anchor="b">
+            <a:normAutofit/>
+          </a:bodyPr>
           <a:lstStyle/>
           <a:p>
             <a:r>
-              <a:rPr lang="en-US" dirty="0" err="1"/>
+              <a:rPr lang="en-US" sz="2800"/>
               <a:t>Sourcetree</a:t>
             </a:r>
-            <a:endParaRPr lang="en-US" dirty="0"/>
           </a:p>
         </p:txBody>
       </p:sp>
@@ -8584,7 +9093,12 @@
             <p:ph idx="1"/>
           </p:nvPr>
         </p:nvSpPr>
-        <p:spPr/>
+        <p:spPr>
+          <a:xfrm>
+            <a:off x="557720" y="2149813"/>
+            <a:ext cx="2312479" cy="3854197"/>
+          </a:xfrm>
+        </p:spPr>
         <p:txBody>
           <a:bodyPr>
             <a:normAutofit/>
@@ -8592,24 +9106,90 @@
           <a:lstStyle/>
           <a:p>
             <a:r>
-              <a:rPr lang="en-US" sz="3200" dirty="0"/>
+              <a:rPr lang="en-US" sz="1400" dirty="0">
+                <a:solidFill>
+                  <a:schemeClr val="tx1">
+                    <a:lumMod val="85000"/>
+                    <a:lumOff val="15000"/>
+                  </a:schemeClr>
+                </a:solidFill>
+              </a:rPr>
               <a:t>Download : </a:t>
             </a:r>
             <a:r>
-              <a:rPr lang="en-US" sz="3200" dirty="0">
+              <a:rPr lang="en-US" sz="1400" dirty="0">
+                <a:solidFill>
+                  <a:schemeClr val="tx1">
+                    <a:lumMod val="85000"/>
+                    <a:lumOff val="15000"/>
+                  </a:schemeClr>
+                </a:solidFill>
                 <a:hlinkClick r:id="rId2"/>
               </a:rPr>
               <a:t>https://www.sourcetreeapp.com/</a:t>
             </a:r>
-            <a:r>
-              <a:rPr lang="en-US" sz="3200" dirty="0"/>
-              <a:t> for Windows</a:t>
-            </a:r>
-          </a:p>
-          <a:p>
-            <a:endParaRPr lang="en-US" sz="3200" dirty="0"/>
+            <a:endParaRPr lang="en-US" sz="1400" dirty="0">
+              <a:solidFill>
+                <a:schemeClr val="tx1">
+                  <a:lumMod val="85000"/>
+                  <a:lumOff val="15000"/>
+                </a:schemeClr>
+              </a:solidFill>
+            </a:endParaRPr>
+          </a:p>
+          <a:p>
+            <a:endParaRPr lang="en-US" sz="1400" dirty="0">
+              <a:solidFill>
+                <a:schemeClr val="tx1">
+                  <a:lumMod val="85000"/>
+                  <a:lumOff val="15000"/>
+                </a:schemeClr>
+              </a:solidFill>
+            </a:endParaRPr>
           </a:p>
         </p:txBody>
+      </p:sp>
+      <p:sp>
+        <p:nvSpPr>
+          <p:cNvPr id="16" name="Rectangle 15">
+            <a:extLst>
+              <a:ext uri="{FF2B5EF4-FFF2-40B4-BE49-F238E27FC236}">
+                <a16:creationId xmlns:a16="http://schemas.microsoft.com/office/drawing/2014/main" id="{68DC0EC7-60EA-4BD3-BC04-D547DE1B2891}"/>
+              </a:ext>
+              <a:ext uri="{C183D7F6-B498-43B3-948B-1728B52AA6E4}">
+                <adec:decorative xmlns:adec="http://schemas.microsoft.com/office/drawing/2017/decorative" val="1"/>
+              </a:ext>
+            </a:extLst>
+          </p:cNvPr>
+          <p:cNvSpPr>
+            <a:spLocks noGrp="1" noRot="1" noChangeAspect="1" noMove="1" noResize="1" noEditPoints="1" noAdjustHandles="1" noChangeArrowheads="1" noChangeShapeType="1" noTextEdit="1"/>
+          </p:cNvSpPr>
+          <p:nvPr>
+            <p:extLst>
+              <p:ext uri="{386F3935-93C4-4BCD-93E2-E3B085C9AB24}">
+                <p16:designElem xmlns:p16="http://schemas.microsoft.com/office/powerpoint/2015/main" val="1"/>
+              </p:ext>
+            </p:extLst>
+          </p:nvPr>
+        </p:nvSpPr>
+        <p:spPr>
+          <a:xfrm>
+            <a:off x="3569764" y="413053"/>
+            <a:ext cx="8212114" cy="6064596"/>
+          </a:xfrm>
+          <a:prstGeom prst="rect">
+            <a:avLst/>
+          </a:prstGeom>
+          <a:noFill/>
+          <a:ln w="6350" cap="sq" cmpd="sng" algn="ctr">
+            <a:solidFill>
+              <a:srgbClr val="404040"/>
+            </a:solidFill>
+            <a:prstDash val="solid"/>
+            <a:miter lim="800000"/>
+          </a:ln>
+          <a:effectLst/>
+        </p:spPr>
       </p:sp>
       <p:pic>
         <p:nvPicPr>
@@ -8639,8 +9219,8 @@
         </p:blipFill>
         <p:spPr>
           <a:xfrm>
-            <a:off x="3730425" y="2986432"/>
-            <a:ext cx="4731149" cy="3228974"/>
+            <a:off x="4049422" y="973278"/>
+            <a:ext cx="7237877" cy="4939851"/>
           </a:xfrm>
           <a:prstGeom prst="rect">
             <a:avLst/>
@@ -8655,7 +9235,1365 @@
     </p:extLst>
   </p:cSld>
   <p:clrMapOvr>
-    <a:masterClrMapping/>
+    <a:overrideClrMapping bg1="dk1" tx1="lt1" bg2="dk2" tx2="lt2" accent1="accent1" accent2="accent2" accent3="accent3" accent4="accent4" accent5="accent5" accent6="accent6" hlink="hlink" folHlink="folHlink"/>
+  </p:clrMapOvr>
+</p:sld>
+</file>
+
+<file path=ppt/slides/slide5.xml><?xml version="1.0" encoding="utf-8"?>
+<p:sld xmlns:a="http://schemas.openxmlformats.org/drawingml/2006/main" xmlns:r="http://schemas.openxmlformats.org/officeDocument/2006/relationships" xmlns:p="http://schemas.openxmlformats.org/presentationml/2006/main">
+  <p:cSld>
+    <p:bg>
+      <p:bgPr>
+        <a:solidFill>
+          <a:schemeClr val="bg1"/>
+        </a:solidFill>
+        <a:effectLst/>
+      </p:bgPr>
+    </p:bg>
+    <p:spTree>
+      <p:nvGrpSpPr>
+        <p:cNvPr id="1" name=""/>
+        <p:cNvGrpSpPr/>
+        <p:nvPr/>
+      </p:nvGrpSpPr>
+      <p:grpSpPr>
+        <a:xfrm>
+          <a:off x="0" y="0"/>
+          <a:ext cx="0" cy="0"/>
+          <a:chOff x="0" y="0"/>
+          <a:chExt cx="0" cy="0"/>
+        </a:xfrm>
+      </p:grpSpPr>
+      <p:sp>
+        <p:nvSpPr>
+          <p:cNvPr id="10" name="Rectangle 9">
+            <a:extLst>
+              <a:ext uri="{FF2B5EF4-FFF2-40B4-BE49-F238E27FC236}">
+                <a16:creationId xmlns:a16="http://schemas.microsoft.com/office/drawing/2014/main" id="{282E2A95-1A08-4118-83C6-B1CA5648E075}"/>
+              </a:ext>
+              <a:ext uri="{C183D7F6-B498-43B3-948B-1728B52AA6E4}">
+                <adec:decorative xmlns:adec="http://schemas.microsoft.com/office/drawing/2017/decorative" val="1"/>
+              </a:ext>
+            </a:extLst>
+          </p:cNvPr>
+          <p:cNvSpPr>
+            <a:spLocks noGrp="1" noRot="1" noChangeAspect="1" noMove="1" noResize="1" noEditPoints="1" noAdjustHandles="1" noChangeArrowheads="1" noChangeShapeType="1" noTextEdit="1"/>
+          </p:cNvSpPr>
+          <p:nvPr>
+            <p:extLst>
+              <p:ext uri="{386F3935-93C4-4BCD-93E2-E3B085C9AB24}">
+                <p16:designElem xmlns:p16="http://schemas.microsoft.com/office/powerpoint/2015/main" val="1"/>
+              </p:ext>
+            </p:extLst>
+          </p:nvPr>
+        </p:nvSpPr>
+        <p:spPr>
+          <a:xfrm>
+            <a:off x="0" y="0"/>
+            <a:ext cx="12192000" cy="6858000"/>
+          </a:xfrm>
+          <a:prstGeom prst="rect">
+            <a:avLst/>
+          </a:prstGeom>
+          <a:ln>
+            <a:noFill/>
+          </a:ln>
+        </p:spPr>
+        <p:style>
+          <a:lnRef idx="2">
+            <a:schemeClr val="accent1">
+              <a:shade val="50000"/>
+            </a:schemeClr>
+          </a:lnRef>
+          <a:fillRef idx="1001">
+            <a:schemeClr val="lt1"/>
+          </a:fillRef>
+          <a:effectRef idx="0">
+            <a:schemeClr val="accent1"/>
+          </a:effectRef>
+          <a:fontRef idx="minor">
+            <a:schemeClr val="lt1"/>
+          </a:fontRef>
+        </p:style>
+        <p:txBody>
+          <a:bodyPr rtlCol="0" anchor="ctr"/>
+          <a:lstStyle/>
+          <a:p>
+            <a:pPr algn="ctr"/>
+            <a:endParaRPr lang="en-US"/>
+          </a:p>
+        </p:txBody>
+      </p:sp>
+      <p:sp>
+        <p:nvSpPr>
+          <p:cNvPr id="12" name="Rectangle 11">
+            <a:extLst>
+              <a:ext uri="{FF2B5EF4-FFF2-40B4-BE49-F238E27FC236}">
+                <a16:creationId xmlns:a16="http://schemas.microsoft.com/office/drawing/2014/main" id="{2FFEFC7E-85EE-4AC9-A351-FBEB13A1D622}"/>
+              </a:ext>
+              <a:ext uri="{C183D7F6-B498-43B3-948B-1728B52AA6E4}">
+                <adec:decorative xmlns:adec="http://schemas.microsoft.com/office/drawing/2017/decorative" val="1"/>
+              </a:ext>
+            </a:extLst>
+          </p:cNvPr>
+          <p:cNvSpPr>
+            <a:spLocks noGrp="1" noRot="1" noChangeAspect="1" noMove="1" noResize="1" noEditPoints="1" noAdjustHandles="1" noChangeArrowheads="1" noChangeShapeType="1" noTextEdit="1"/>
+          </p:cNvSpPr>
+          <p:nvPr>
+            <p:extLst>
+              <p:ext uri="{386F3935-93C4-4BCD-93E2-E3B085C9AB24}">
+                <p16:designElem xmlns:p16="http://schemas.microsoft.com/office/powerpoint/2015/main" val="1"/>
+              </p:ext>
+            </p:extLst>
+          </p:nvPr>
+        </p:nvSpPr>
+        <p:spPr>
+          <a:xfrm>
+            <a:off x="245534" y="237744"/>
+            <a:ext cx="2926080" cy="6382512"/>
+          </a:xfrm>
+          <a:prstGeom prst="rect">
+            <a:avLst/>
+          </a:prstGeom>
+          <a:solidFill>
+            <a:schemeClr val="bg1">
+              <a:lumMod val="75000"/>
+              <a:lumOff val="25000"/>
+            </a:schemeClr>
+          </a:solidFill>
+          <a:ln>
+            <a:noFill/>
+          </a:ln>
+        </p:spPr>
+        <p:style>
+          <a:lnRef idx="2">
+            <a:schemeClr val="accent1">
+              <a:shade val="50000"/>
+            </a:schemeClr>
+          </a:lnRef>
+          <a:fillRef idx="1">
+            <a:schemeClr val="accent1"/>
+          </a:fillRef>
+          <a:effectRef idx="0">
+            <a:schemeClr val="accent1"/>
+          </a:effectRef>
+          <a:fontRef idx="minor">
+            <a:schemeClr val="lt1"/>
+          </a:fontRef>
+        </p:style>
+      </p:sp>
+      <p:sp>
+        <p:nvSpPr>
+          <p:cNvPr id="14" name="Rectangle 13">
+            <a:extLst>
+              <a:ext uri="{FF2B5EF4-FFF2-40B4-BE49-F238E27FC236}">
+                <a16:creationId xmlns:a16="http://schemas.microsoft.com/office/drawing/2014/main" id="{CB2511BB-FC4C-45F3-94EB-661D6806C942}"/>
+              </a:ext>
+              <a:ext uri="{C183D7F6-B498-43B3-948B-1728B52AA6E4}">
+                <adec:decorative xmlns:adec="http://schemas.microsoft.com/office/drawing/2017/decorative" val="1"/>
+              </a:ext>
+            </a:extLst>
+          </p:cNvPr>
+          <p:cNvSpPr>
+            <a:spLocks noGrp="1" noRot="1" noChangeAspect="1" noMove="1" noResize="1" noEditPoints="1" noAdjustHandles="1" noChangeArrowheads="1" noChangeShapeType="1" noTextEdit="1"/>
+          </p:cNvSpPr>
+          <p:nvPr>
+            <p:extLst>
+              <p:ext uri="{386F3935-93C4-4BCD-93E2-E3B085C9AB24}">
+                <p16:designElem xmlns:p16="http://schemas.microsoft.com/office/powerpoint/2015/main" val="1"/>
+              </p:ext>
+            </p:extLst>
+          </p:nvPr>
+        </p:nvSpPr>
+        <p:spPr>
+          <a:xfrm>
+            <a:off x="419100" y="413053"/>
+            <a:ext cx="2616201" cy="6064596"/>
+          </a:xfrm>
+          <a:prstGeom prst="rect">
+            <a:avLst/>
+          </a:prstGeom>
+          <a:noFill/>
+          <a:ln w="6350">
+            <a:solidFill>
+              <a:schemeClr val="tx1">
+                <a:lumMod val="75000"/>
+                <a:lumOff val="25000"/>
+              </a:schemeClr>
+            </a:solidFill>
+          </a:ln>
+        </p:spPr>
+        <p:style>
+          <a:lnRef idx="2">
+            <a:schemeClr val="accent1">
+              <a:shade val="50000"/>
+            </a:schemeClr>
+          </a:lnRef>
+          <a:fillRef idx="1">
+            <a:schemeClr val="accent1"/>
+          </a:fillRef>
+          <a:effectRef idx="0">
+            <a:schemeClr val="accent1"/>
+          </a:effectRef>
+          <a:fontRef idx="minor">
+            <a:schemeClr val="lt1"/>
+          </a:fontRef>
+        </p:style>
+        <p:txBody>
+          <a:bodyPr rtlCol="0" anchor="ctr"/>
+          <a:lstStyle/>
+          <a:p>
+            <a:pPr algn="ctr"/>
+            <a:endParaRPr lang="en-US"/>
+          </a:p>
+        </p:txBody>
+      </p:sp>
+      <p:sp>
+        <p:nvSpPr>
+          <p:cNvPr id="2" name="Title 1">
+            <a:extLst>
+              <a:ext uri="{FF2B5EF4-FFF2-40B4-BE49-F238E27FC236}">
+                <a16:creationId xmlns:a16="http://schemas.microsoft.com/office/drawing/2014/main" id="{CC5A8BDD-C6A6-46EA-A598-46368AC4AA71}"/>
+              </a:ext>
+            </a:extLst>
+          </p:cNvPr>
+          <p:cNvSpPr>
+            <a:spLocks noGrp="1"/>
+          </p:cNvSpPr>
+          <p:nvPr>
+            <p:ph type="title"/>
+          </p:nvPr>
+        </p:nvSpPr>
+        <p:spPr>
+          <a:xfrm>
+            <a:off x="557720" y="612843"/>
+            <a:ext cx="2312480" cy="1499738"/>
+          </a:xfrm>
+        </p:spPr>
+        <p:txBody>
+          <a:bodyPr anchor="b">
+            <a:normAutofit/>
+          </a:bodyPr>
+          <a:lstStyle/>
+          <a:p>
+            <a:r>
+              <a:rPr lang="en-US" sz="2800"/>
+              <a:t>MySQL &amp; Workbench</a:t>
+            </a:r>
+          </a:p>
+        </p:txBody>
+      </p:sp>
+      <p:sp>
+        <p:nvSpPr>
+          <p:cNvPr id="3" name="Content Placeholder 2">
+            <a:extLst>
+              <a:ext uri="{FF2B5EF4-FFF2-40B4-BE49-F238E27FC236}">
+                <a16:creationId xmlns:a16="http://schemas.microsoft.com/office/drawing/2014/main" id="{5B139529-2B96-4EB5-BD82-191573CC2B90}"/>
+              </a:ext>
+            </a:extLst>
+          </p:cNvPr>
+          <p:cNvSpPr>
+            <a:spLocks noGrp="1"/>
+          </p:cNvSpPr>
+          <p:nvPr>
+            <p:ph idx="1"/>
+          </p:nvPr>
+        </p:nvSpPr>
+        <p:spPr>
+          <a:xfrm>
+            <a:off x="557720" y="2149813"/>
+            <a:ext cx="2312479" cy="3854197"/>
+          </a:xfrm>
+        </p:spPr>
+        <p:txBody>
+          <a:bodyPr>
+            <a:normAutofit/>
+          </a:bodyPr>
+          <a:lstStyle/>
+          <a:p>
+            <a:r>
+              <a:rPr lang="en-US" sz="1400" dirty="0">
+                <a:solidFill>
+                  <a:schemeClr val="tx1">
+                    <a:lumMod val="85000"/>
+                    <a:lumOff val="15000"/>
+                  </a:schemeClr>
+                </a:solidFill>
+              </a:rPr>
+              <a:t>Download : </a:t>
+            </a:r>
+            <a:r>
+              <a:rPr lang="en-US" sz="1400" dirty="0">
+                <a:solidFill>
+                  <a:schemeClr val="tx1">
+                    <a:lumMod val="85000"/>
+                    <a:lumOff val="15000"/>
+                  </a:schemeClr>
+                </a:solidFill>
+                <a:hlinkClick r:id="rId2"/>
+              </a:rPr>
+              <a:t>https://dev.mysql.com/downloads/mysql/</a:t>
+            </a:r>
+            <a:endParaRPr lang="en-US" sz="1400" dirty="0">
+              <a:solidFill>
+                <a:schemeClr val="tx1">
+                  <a:lumMod val="85000"/>
+                  <a:lumOff val="15000"/>
+                </a:schemeClr>
+              </a:solidFill>
+            </a:endParaRPr>
+          </a:p>
+          <a:p>
+            <a:endParaRPr lang="en-US" sz="1400" dirty="0">
+              <a:solidFill>
+                <a:schemeClr val="tx1">
+                  <a:lumMod val="85000"/>
+                  <a:lumOff val="15000"/>
+                </a:schemeClr>
+              </a:solidFill>
+            </a:endParaRPr>
+          </a:p>
+          <a:p>
+            <a:endParaRPr lang="en-US" sz="1400" dirty="0">
+              <a:solidFill>
+                <a:schemeClr val="tx1">
+                  <a:lumMod val="85000"/>
+                  <a:lumOff val="15000"/>
+                </a:schemeClr>
+              </a:solidFill>
+            </a:endParaRPr>
+          </a:p>
+        </p:txBody>
+      </p:sp>
+      <p:sp>
+        <p:nvSpPr>
+          <p:cNvPr id="16" name="Rectangle 15">
+            <a:extLst>
+              <a:ext uri="{FF2B5EF4-FFF2-40B4-BE49-F238E27FC236}">
+                <a16:creationId xmlns:a16="http://schemas.microsoft.com/office/drawing/2014/main" id="{68DC0EC7-60EA-4BD3-BC04-D547DE1B2891}"/>
+              </a:ext>
+              <a:ext uri="{C183D7F6-B498-43B3-948B-1728B52AA6E4}">
+                <adec:decorative xmlns:adec="http://schemas.microsoft.com/office/drawing/2017/decorative" val="1"/>
+              </a:ext>
+            </a:extLst>
+          </p:cNvPr>
+          <p:cNvSpPr>
+            <a:spLocks noGrp="1" noRot="1" noChangeAspect="1" noMove="1" noResize="1" noEditPoints="1" noAdjustHandles="1" noChangeArrowheads="1" noChangeShapeType="1" noTextEdit="1"/>
+          </p:cNvSpPr>
+          <p:nvPr>
+            <p:extLst>
+              <p:ext uri="{386F3935-93C4-4BCD-93E2-E3B085C9AB24}">
+                <p16:designElem xmlns:p16="http://schemas.microsoft.com/office/powerpoint/2015/main" val="1"/>
+              </p:ext>
+            </p:extLst>
+          </p:nvPr>
+        </p:nvSpPr>
+        <p:spPr>
+          <a:xfrm>
+            <a:off x="3569764" y="413053"/>
+            <a:ext cx="8212114" cy="6064596"/>
+          </a:xfrm>
+          <a:prstGeom prst="rect">
+            <a:avLst/>
+          </a:prstGeom>
+          <a:noFill/>
+          <a:ln w="6350" cap="sq" cmpd="sng" algn="ctr">
+            <a:solidFill>
+              <a:srgbClr val="404040"/>
+            </a:solidFill>
+            <a:prstDash val="solid"/>
+            <a:miter lim="800000"/>
+          </a:ln>
+          <a:effectLst/>
+        </p:spPr>
+      </p:sp>
+      <p:pic>
+        <p:nvPicPr>
+          <p:cNvPr id="5" name="Picture 4" descr="A screenshot of a social media post&#10;&#10;Description automatically generated">
+            <a:extLst>
+              <a:ext uri="{FF2B5EF4-FFF2-40B4-BE49-F238E27FC236}">
+                <a16:creationId xmlns:a16="http://schemas.microsoft.com/office/drawing/2014/main" id="{0C211510-3143-45FE-B717-057AF336E671}"/>
+              </a:ext>
+            </a:extLst>
+          </p:cNvPr>
+          <p:cNvPicPr>
+            <a:picLocks noChangeAspect="1"/>
+          </p:cNvPicPr>
+          <p:nvPr/>
+        </p:nvPicPr>
+        <p:blipFill>
+          <a:blip r:embed="rId3">
+            <a:extLst>
+              <a:ext uri="{28A0092B-C50C-407E-A947-70E740481C1C}">
+                <a14:useLocalDpi xmlns:a14="http://schemas.microsoft.com/office/drawing/2010/main" val="0"/>
+              </a:ext>
+            </a:extLst>
+          </a:blip>
+          <a:stretch>
+            <a:fillRect/>
+          </a:stretch>
+        </p:blipFill>
+        <p:spPr>
+          <a:xfrm>
+            <a:off x="4049422" y="1443740"/>
+            <a:ext cx="7237877" cy="3998927"/>
+          </a:xfrm>
+          <a:prstGeom prst="rect">
+            <a:avLst/>
+          </a:prstGeom>
+        </p:spPr>
+      </p:pic>
+    </p:spTree>
+    <p:extLst>
+      <p:ext uri="{BB962C8B-B14F-4D97-AF65-F5344CB8AC3E}">
+        <p14:creationId xmlns:p14="http://schemas.microsoft.com/office/powerpoint/2010/main" val="3004216952"/>
+      </p:ext>
+    </p:extLst>
+  </p:cSld>
+  <p:clrMapOvr>
+    <a:overrideClrMapping bg1="dk1" tx1="lt1" bg2="dk2" tx2="lt2" accent1="accent1" accent2="accent2" accent3="accent3" accent4="accent4" accent5="accent5" accent6="accent6" hlink="hlink" folHlink="folHlink"/>
+  </p:clrMapOvr>
+</p:sld>
+</file>
+
+<file path=ppt/slides/slide6.xml><?xml version="1.0" encoding="utf-8"?>
+<p:sld xmlns:a="http://schemas.openxmlformats.org/drawingml/2006/main" xmlns:r="http://schemas.openxmlformats.org/officeDocument/2006/relationships" xmlns:p="http://schemas.openxmlformats.org/presentationml/2006/main">
+  <p:cSld>
+    <p:bg>
+      <p:bgPr>
+        <a:solidFill>
+          <a:schemeClr val="bg1"/>
+        </a:solidFill>
+        <a:effectLst/>
+      </p:bgPr>
+    </p:bg>
+    <p:spTree>
+      <p:nvGrpSpPr>
+        <p:cNvPr id="1" name=""/>
+        <p:cNvGrpSpPr/>
+        <p:nvPr/>
+      </p:nvGrpSpPr>
+      <p:grpSpPr>
+        <a:xfrm>
+          <a:off x="0" y="0"/>
+          <a:ext cx="0" cy="0"/>
+          <a:chOff x="0" y="0"/>
+          <a:chExt cx="0" cy="0"/>
+        </a:xfrm>
+      </p:grpSpPr>
+      <p:sp>
+        <p:nvSpPr>
+          <p:cNvPr id="10" name="Rectangle 9">
+            <a:extLst>
+              <a:ext uri="{FF2B5EF4-FFF2-40B4-BE49-F238E27FC236}">
+                <a16:creationId xmlns:a16="http://schemas.microsoft.com/office/drawing/2014/main" id="{282E2A95-1A08-4118-83C6-B1CA5648E075}"/>
+              </a:ext>
+              <a:ext uri="{C183D7F6-B498-43B3-948B-1728B52AA6E4}">
+                <adec:decorative xmlns:adec="http://schemas.microsoft.com/office/drawing/2017/decorative" val="1"/>
+              </a:ext>
+            </a:extLst>
+          </p:cNvPr>
+          <p:cNvSpPr>
+            <a:spLocks noGrp="1" noRot="1" noChangeAspect="1" noMove="1" noResize="1" noEditPoints="1" noAdjustHandles="1" noChangeArrowheads="1" noChangeShapeType="1" noTextEdit="1"/>
+          </p:cNvSpPr>
+          <p:nvPr>
+            <p:extLst>
+              <p:ext uri="{386F3935-93C4-4BCD-93E2-E3B085C9AB24}">
+                <p16:designElem xmlns:p16="http://schemas.microsoft.com/office/powerpoint/2015/main" val="1"/>
+              </p:ext>
+            </p:extLst>
+          </p:nvPr>
+        </p:nvSpPr>
+        <p:spPr>
+          <a:xfrm>
+            <a:off x="0" y="0"/>
+            <a:ext cx="12192000" cy="6858000"/>
+          </a:xfrm>
+          <a:prstGeom prst="rect">
+            <a:avLst/>
+          </a:prstGeom>
+          <a:ln>
+            <a:noFill/>
+          </a:ln>
+        </p:spPr>
+        <p:style>
+          <a:lnRef idx="2">
+            <a:schemeClr val="accent1">
+              <a:shade val="50000"/>
+            </a:schemeClr>
+          </a:lnRef>
+          <a:fillRef idx="1001">
+            <a:schemeClr val="lt1"/>
+          </a:fillRef>
+          <a:effectRef idx="0">
+            <a:schemeClr val="accent1"/>
+          </a:effectRef>
+          <a:fontRef idx="minor">
+            <a:schemeClr val="lt1"/>
+          </a:fontRef>
+        </p:style>
+        <p:txBody>
+          <a:bodyPr rtlCol="0" anchor="ctr"/>
+          <a:lstStyle/>
+          <a:p>
+            <a:pPr algn="ctr"/>
+            <a:endParaRPr lang="en-US"/>
+          </a:p>
+        </p:txBody>
+      </p:sp>
+      <p:sp>
+        <p:nvSpPr>
+          <p:cNvPr id="12" name="Rectangle 11">
+            <a:extLst>
+              <a:ext uri="{FF2B5EF4-FFF2-40B4-BE49-F238E27FC236}">
+                <a16:creationId xmlns:a16="http://schemas.microsoft.com/office/drawing/2014/main" id="{2FFEFC7E-85EE-4AC9-A351-FBEB13A1D622}"/>
+              </a:ext>
+              <a:ext uri="{C183D7F6-B498-43B3-948B-1728B52AA6E4}">
+                <adec:decorative xmlns:adec="http://schemas.microsoft.com/office/drawing/2017/decorative" val="1"/>
+              </a:ext>
+            </a:extLst>
+          </p:cNvPr>
+          <p:cNvSpPr>
+            <a:spLocks noGrp="1" noRot="1" noChangeAspect="1" noMove="1" noResize="1" noEditPoints="1" noAdjustHandles="1" noChangeArrowheads="1" noChangeShapeType="1" noTextEdit="1"/>
+          </p:cNvSpPr>
+          <p:nvPr>
+            <p:extLst>
+              <p:ext uri="{386F3935-93C4-4BCD-93E2-E3B085C9AB24}">
+                <p16:designElem xmlns:p16="http://schemas.microsoft.com/office/powerpoint/2015/main" val="1"/>
+              </p:ext>
+            </p:extLst>
+          </p:nvPr>
+        </p:nvSpPr>
+        <p:spPr>
+          <a:xfrm>
+            <a:off x="245534" y="237744"/>
+            <a:ext cx="2926080" cy="6382512"/>
+          </a:xfrm>
+          <a:prstGeom prst="rect">
+            <a:avLst/>
+          </a:prstGeom>
+          <a:solidFill>
+            <a:schemeClr val="bg1">
+              <a:lumMod val="75000"/>
+              <a:lumOff val="25000"/>
+            </a:schemeClr>
+          </a:solidFill>
+          <a:ln>
+            <a:noFill/>
+          </a:ln>
+        </p:spPr>
+        <p:style>
+          <a:lnRef idx="2">
+            <a:schemeClr val="accent1">
+              <a:shade val="50000"/>
+            </a:schemeClr>
+          </a:lnRef>
+          <a:fillRef idx="1">
+            <a:schemeClr val="accent1"/>
+          </a:fillRef>
+          <a:effectRef idx="0">
+            <a:schemeClr val="accent1"/>
+          </a:effectRef>
+          <a:fontRef idx="minor">
+            <a:schemeClr val="lt1"/>
+          </a:fontRef>
+        </p:style>
+      </p:sp>
+      <p:sp>
+        <p:nvSpPr>
+          <p:cNvPr id="14" name="Rectangle 13">
+            <a:extLst>
+              <a:ext uri="{FF2B5EF4-FFF2-40B4-BE49-F238E27FC236}">
+                <a16:creationId xmlns:a16="http://schemas.microsoft.com/office/drawing/2014/main" id="{CB2511BB-FC4C-45F3-94EB-661D6806C942}"/>
+              </a:ext>
+              <a:ext uri="{C183D7F6-B498-43B3-948B-1728B52AA6E4}">
+                <adec:decorative xmlns:adec="http://schemas.microsoft.com/office/drawing/2017/decorative" val="1"/>
+              </a:ext>
+            </a:extLst>
+          </p:cNvPr>
+          <p:cNvSpPr>
+            <a:spLocks noGrp="1" noRot="1" noChangeAspect="1" noMove="1" noResize="1" noEditPoints="1" noAdjustHandles="1" noChangeArrowheads="1" noChangeShapeType="1" noTextEdit="1"/>
+          </p:cNvSpPr>
+          <p:nvPr>
+            <p:extLst>
+              <p:ext uri="{386F3935-93C4-4BCD-93E2-E3B085C9AB24}">
+                <p16:designElem xmlns:p16="http://schemas.microsoft.com/office/powerpoint/2015/main" val="1"/>
+              </p:ext>
+            </p:extLst>
+          </p:nvPr>
+        </p:nvSpPr>
+        <p:spPr>
+          <a:xfrm>
+            <a:off x="419100" y="413053"/>
+            <a:ext cx="2616201" cy="6064596"/>
+          </a:xfrm>
+          <a:prstGeom prst="rect">
+            <a:avLst/>
+          </a:prstGeom>
+          <a:noFill/>
+          <a:ln w="6350">
+            <a:solidFill>
+              <a:schemeClr val="tx1">
+                <a:lumMod val="75000"/>
+                <a:lumOff val="25000"/>
+              </a:schemeClr>
+            </a:solidFill>
+          </a:ln>
+        </p:spPr>
+        <p:style>
+          <a:lnRef idx="2">
+            <a:schemeClr val="accent1">
+              <a:shade val="50000"/>
+            </a:schemeClr>
+          </a:lnRef>
+          <a:fillRef idx="1">
+            <a:schemeClr val="accent1"/>
+          </a:fillRef>
+          <a:effectRef idx="0">
+            <a:schemeClr val="accent1"/>
+          </a:effectRef>
+          <a:fontRef idx="minor">
+            <a:schemeClr val="lt1"/>
+          </a:fontRef>
+        </p:style>
+        <p:txBody>
+          <a:bodyPr rtlCol="0" anchor="ctr"/>
+          <a:lstStyle/>
+          <a:p>
+            <a:pPr algn="ctr"/>
+            <a:endParaRPr lang="en-US"/>
+          </a:p>
+        </p:txBody>
+      </p:sp>
+      <p:sp>
+        <p:nvSpPr>
+          <p:cNvPr id="2" name="Title 1">
+            <a:extLst>
+              <a:ext uri="{FF2B5EF4-FFF2-40B4-BE49-F238E27FC236}">
+                <a16:creationId xmlns:a16="http://schemas.microsoft.com/office/drawing/2014/main" id="{A63B2539-3F74-4B79-8633-9BAF4B5AC92B}"/>
+              </a:ext>
+            </a:extLst>
+          </p:cNvPr>
+          <p:cNvSpPr>
+            <a:spLocks noGrp="1"/>
+          </p:cNvSpPr>
+          <p:nvPr>
+            <p:ph type="title"/>
+          </p:nvPr>
+        </p:nvSpPr>
+        <p:spPr>
+          <a:xfrm>
+            <a:off x="557720" y="612843"/>
+            <a:ext cx="2312480" cy="1499738"/>
+          </a:xfrm>
+        </p:spPr>
+        <p:txBody>
+          <a:bodyPr anchor="b">
+            <a:normAutofit/>
+          </a:bodyPr>
+          <a:lstStyle/>
+          <a:p>
+            <a:r>
+              <a:rPr lang="en-US" sz="2800"/>
+              <a:t>Postman</a:t>
+            </a:r>
+          </a:p>
+        </p:txBody>
+      </p:sp>
+      <p:sp>
+        <p:nvSpPr>
+          <p:cNvPr id="3" name="Content Placeholder 2">
+            <a:extLst>
+              <a:ext uri="{FF2B5EF4-FFF2-40B4-BE49-F238E27FC236}">
+                <a16:creationId xmlns:a16="http://schemas.microsoft.com/office/drawing/2014/main" id="{3B11E4A9-B380-475F-BB5B-6ABDB8EAEFB1}"/>
+              </a:ext>
+            </a:extLst>
+          </p:cNvPr>
+          <p:cNvSpPr>
+            <a:spLocks noGrp="1"/>
+          </p:cNvSpPr>
+          <p:nvPr>
+            <p:ph idx="1"/>
+          </p:nvPr>
+        </p:nvSpPr>
+        <p:spPr>
+          <a:xfrm>
+            <a:off x="557720" y="2149813"/>
+            <a:ext cx="2312479" cy="3854197"/>
+          </a:xfrm>
+        </p:spPr>
+        <p:txBody>
+          <a:bodyPr>
+            <a:normAutofit/>
+          </a:bodyPr>
+          <a:lstStyle/>
+          <a:p>
+            <a:r>
+              <a:rPr lang="en-US" sz="1400">
+                <a:solidFill>
+                  <a:schemeClr val="tx1">
+                    <a:lumMod val="85000"/>
+                    <a:lumOff val="15000"/>
+                  </a:schemeClr>
+                </a:solidFill>
+              </a:rPr>
+              <a:t>Download : </a:t>
+            </a:r>
+            <a:r>
+              <a:rPr lang="en-US" sz="1400">
+                <a:solidFill>
+                  <a:schemeClr val="tx1">
+                    <a:lumMod val="85000"/>
+                    <a:lumOff val="15000"/>
+                  </a:schemeClr>
+                </a:solidFill>
+                <a:hlinkClick r:id="rId2"/>
+              </a:rPr>
+              <a:t>https://www.getpostman.com/downloads/</a:t>
+            </a:r>
+            <a:endParaRPr lang="en-US" sz="1400">
+              <a:solidFill>
+                <a:schemeClr val="tx1">
+                  <a:lumMod val="85000"/>
+                  <a:lumOff val="15000"/>
+                </a:schemeClr>
+              </a:solidFill>
+            </a:endParaRPr>
+          </a:p>
+          <a:p>
+            <a:endParaRPr lang="en-US" sz="1400">
+              <a:solidFill>
+                <a:schemeClr val="tx1">
+                  <a:lumMod val="85000"/>
+                  <a:lumOff val="15000"/>
+                </a:schemeClr>
+              </a:solidFill>
+            </a:endParaRPr>
+          </a:p>
+        </p:txBody>
+      </p:sp>
+      <p:sp>
+        <p:nvSpPr>
+          <p:cNvPr id="16" name="Rectangle 15">
+            <a:extLst>
+              <a:ext uri="{FF2B5EF4-FFF2-40B4-BE49-F238E27FC236}">
+                <a16:creationId xmlns:a16="http://schemas.microsoft.com/office/drawing/2014/main" id="{68DC0EC7-60EA-4BD3-BC04-D547DE1B2891}"/>
+              </a:ext>
+              <a:ext uri="{C183D7F6-B498-43B3-948B-1728B52AA6E4}">
+                <adec:decorative xmlns:adec="http://schemas.microsoft.com/office/drawing/2017/decorative" val="1"/>
+              </a:ext>
+            </a:extLst>
+          </p:cNvPr>
+          <p:cNvSpPr>
+            <a:spLocks noGrp="1" noRot="1" noChangeAspect="1" noMove="1" noResize="1" noEditPoints="1" noAdjustHandles="1" noChangeArrowheads="1" noChangeShapeType="1" noTextEdit="1"/>
+          </p:cNvSpPr>
+          <p:nvPr>
+            <p:extLst>
+              <p:ext uri="{386F3935-93C4-4BCD-93E2-E3B085C9AB24}">
+                <p16:designElem xmlns:p16="http://schemas.microsoft.com/office/powerpoint/2015/main" val="1"/>
+              </p:ext>
+            </p:extLst>
+          </p:nvPr>
+        </p:nvSpPr>
+        <p:spPr>
+          <a:xfrm>
+            <a:off x="3569764" y="413053"/>
+            <a:ext cx="8212114" cy="6064596"/>
+          </a:xfrm>
+          <a:prstGeom prst="rect">
+            <a:avLst/>
+          </a:prstGeom>
+          <a:noFill/>
+          <a:ln w="6350" cap="sq" cmpd="sng" algn="ctr">
+            <a:solidFill>
+              <a:srgbClr val="404040"/>
+            </a:solidFill>
+            <a:prstDash val="solid"/>
+            <a:miter lim="800000"/>
+          </a:ln>
+          <a:effectLst/>
+        </p:spPr>
+      </p:sp>
+      <p:pic>
+        <p:nvPicPr>
+          <p:cNvPr id="5" name="Picture 4" descr="A screenshot of a cell phone&#10;&#10;Description automatically generated">
+            <a:extLst>
+              <a:ext uri="{FF2B5EF4-FFF2-40B4-BE49-F238E27FC236}">
+                <a16:creationId xmlns:a16="http://schemas.microsoft.com/office/drawing/2014/main" id="{6C239002-DEFA-44E0-B0A1-58797D0C8297}"/>
+              </a:ext>
+            </a:extLst>
+          </p:cNvPr>
+          <p:cNvPicPr>
+            <a:picLocks noChangeAspect="1"/>
+          </p:cNvPicPr>
+          <p:nvPr/>
+        </p:nvPicPr>
+        <p:blipFill>
+          <a:blip r:embed="rId3">
+            <a:extLst>
+              <a:ext uri="{28A0092B-C50C-407E-A947-70E740481C1C}">
+                <a14:useLocalDpi xmlns:a14="http://schemas.microsoft.com/office/drawing/2010/main" val="0"/>
+              </a:ext>
+            </a:extLst>
+          </a:blip>
+          <a:stretch>
+            <a:fillRect/>
+          </a:stretch>
+        </p:blipFill>
+        <p:spPr>
+          <a:xfrm>
+            <a:off x="4049422" y="1850871"/>
+            <a:ext cx="7237877" cy="3184665"/>
+          </a:xfrm>
+          <a:prstGeom prst="rect">
+            <a:avLst/>
+          </a:prstGeom>
+        </p:spPr>
+      </p:pic>
+    </p:spTree>
+    <p:extLst>
+      <p:ext uri="{BB962C8B-B14F-4D97-AF65-F5344CB8AC3E}">
+        <p14:creationId xmlns:p14="http://schemas.microsoft.com/office/powerpoint/2010/main" val="3256643967"/>
+      </p:ext>
+    </p:extLst>
+  </p:cSld>
+  <p:clrMapOvr>
+    <a:overrideClrMapping bg1="dk1" tx1="lt1" bg2="dk2" tx2="lt2" accent1="accent1" accent2="accent2" accent3="accent3" accent4="accent4" accent5="accent5" accent6="accent6" hlink="hlink" folHlink="folHlink"/>
+  </p:clrMapOvr>
+</p:sld>
+</file>
+
+<file path=ppt/slides/slide7.xml><?xml version="1.0" encoding="utf-8"?>
+<p:sld xmlns:a="http://schemas.openxmlformats.org/drawingml/2006/main" xmlns:r="http://schemas.openxmlformats.org/officeDocument/2006/relationships" xmlns:p="http://schemas.openxmlformats.org/presentationml/2006/main">
+  <p:cSld>
+    <p:bg>
+      <p:bgPr>
+        <a:solidFill>
+          <a:schemeClr val="bg1"/>
+        </a:solidFill>
+        <a:effectLst/>
+      </p:bgPr>
+    </p:bg>
+    <p:spTree>
+      <p:nvGrpSpPr>
+        <p:cNvPr id="1" name=""/>
+        <p:cNvGrpSpPr/>
+        <p:nvPr/>
+      </p:nvGrpSpPr>
+      <p:grpSpPr>
+        <a:xfrm>
+          <a:off x="0" y="0"/>
+          <a:ext cx="0" cy="0"/>
+          <a:chOff x="0" y="0"/>
+          <a:chExt cx="0" cy="0"/>
+        </a:xfrm>
+      </p:grpSpPr>
+      <p:sp>
+        <p:nvSpPr>
+          <p:cNvPr id="10" name="Rectangle 9">
+            <a:extLst>
+              <a:ext uri="{FF2B5EF4-FFF2-40B4-BE49-F238E27FC236}">
+                <a16:creationId xmlns:a16="http://schemas.microsoft.com/office/drawing/2014/main" id="{282E2A95-1A08-4118-83C6-B1CA5648E075}"/>
+              </a:ext>
+              <a:ext uri="{C183D7F6-B498-43B3-948B-1728B52AA6E4}">
+                <adec:decorative xmlns:adec="http://schemas.microsoft.com/office/drawing/2017/decorative" val="1"/>
+              </a:ext>
+            </a:extLst>
+          </p:cNvPr>
+          <p:cNvSpPr>
+            <a:spLocks noGrp="1" noRot="1" noChangeAspect="1" noMove="1" noResize="1" noEditPoints="1" noAdjustHandles="1" noChangeArrowheads="1" noChangeShapeType="1" noTextEdit="1"/>
+          </p:cNvSpPr>
+          <p:nvPr>
+            <p:extLst>
+              <p:ext uri="{386F3935-93C4-4BCD-93E2-E3B085C9AB24}">
+                <p16:designElem xmlns:p16="http://schemas.microsoft.com/office/powerpoint/2015/main" val="1"/>
+              </p:ext>
+            </p:extLst>
+          </p:nvPr>
+        </p:nvSpPr>
+        <p:spPr>
+          <a:xfrm>
+            <a:off x="0" y="0"/>
+            <a:ext cx="12192000" cy="6858000"/>
+          </a:xfrm>
+          <a:prstGeom prst="rect">
+            <a:avLst/>
+          </a:prstGeom>
+          <a:ln>
+            <a:noFill/>
+          </a:ln>
+        </p:spPr>
+        <p:style>
+          <a:lnRef idx="2">
+            <a:schemeClr val="accent1">
+              <a:shade val="50000"/>
+            </a:schemeClr>
+          </a:lnRef>
+          <a:fillRef idx="1001">
+            <a:schemeClr val="lt1"/>
+          </a:fillRef>
+          <a:effectRef idx="0">
+            <a:schemeClr val="accent1"/>
+          </a:effectRef>
+          <a:fontRef idx="minor">
+            <a:schemeClr val="lt1"/>
+          </a:fontRef>
+        </p:style>
+        <p:txBody>
+          <a:bodyPr rtlCol="0" anchor="ctr"/>
+          <a:lstStyle/>
+          <a:p>
+            <a:pPr algn="ctr"/>
+            <a:endParaRPr lang="en-US"/>
+          </a:p>
+        </p:txBody>
+      </p:sp>
+      <p:sp>
+        <p:nvSpPr>
+          <p:cNvPr id="12" name="Rectangle 11">
+            <a:extLst>
+              <a:ext uri="{FF2B5EF4-FFF2-40B4-BE49-F238E27FC236}">
+                <a16:creationId xmlns:a16="http://schemas.microsoft.com/office/drawing/2014/main" id="{2FFEFC7E-85EE-4AC9-A351-FBEB13A1D622}"/>
+              </a:ext>
+              <a:ext uri="{C183D7F6-B498-43B3-948B-1728B52AA6E4}">
+                <adec:decorative xmlns:adec="http://schemas.microsoft.com/office/drawing/2017/decorative" val="1"/>
+              </a:ext>
+            </a:extLst>
+          </p:cNvPr>
+          <p:cNvSpPr>
+            <a:spLocks noGrp="1" noRot="1" noChangeAspect="1" noMove="1" noResize="1" noEditPoints="1" noAdjustHandles="1" noChangeArrowheads="1" noChangeShapeType="1" noTextEdit="1"/>
+          </p:cNvSpPr>
+          <p:nvPr>
+            <p:extLst>
+              <p:ext uri="{386F3935-93C4-4BCD-93E2-E3B085C9AB24}">
+                <p16:designElem xmlns:p16="http://schemas.microsoft.com/office/powerpoint/2015/main" val="1"/>
+              </p:ext>
+            </p:extLst>
+          </p:nvPr>
+        </p:nvSpPr>
+        <p:spPr>
+          <a:xfrm>
+            <a:off x="245534" y="237744"/>
+            <a:ext cx="2926080" cy="6382512"/>
+          </a:xfrm>
+          <a:prstGeom prst="rect">
+            <a:avLst/>
+          </a:prstGeom>
+          <a:solidFill>
+            <a:schemeClr val="bg1">
+              <a:lumMod val="75000"/>
+              <a:lumOff val="25000"/>
+            </a:schemeClr>
+          </a:solidFill>
+          <a:ln>
+            <a:noFill/>
+          </a:ln>
+        </p:spPr>
+        <p:style>
+          <a:lnRef idx="2">
+            <a:schemeClr val="accent1">
+              <a:shade val="50000"/>
+            </a:schemeClr>
+          </a:lnRef>
+          <a:fillRef idx="1">
+            <a:schemeClr val="accent1"/>
+          </a:fillRef>
+          <a:effectRef idx="0">
+            <a:schemeClr val="accent1"/>
+          </a:effectRef>
+          <a:fontRef idx="minor">
+            <a:schemeClr val="lt1"/>
+          </a:fontRef>
+        </p:style>
+      </p:sp>
+      <p:sp>
+        <p:nvSpPr>
+          <p:cNvPr id="14" name="Rectangle 13">
+            <a:extLst>
+              <a:ext uri="{FF2B5EF4-FFF2-40B4-BE49-F238E27FC236}">
+                <a16:creationId xmlns:a16="http://schemas.microsoft.com/office/drawing/2014/main" id="{CB2511BB-FC4C-45F3-94EB-661D6806C942}"/>
+              </a:ext>
+              <a:ext uri="{C183D7F6-B498-43B3-948B-1728B52AA6E4}">
+                <adec:decorative xmlns:adec="http://schemas.microsoft.com/office/drawing/2017/decorative" val="1"/>
+              </a:ext>
+            </a:extLst>
+          </p:cNvPr>
+          <p:cNvSpPr>
+            <a:spLocks noGrp="1" noRot="1" noChangeAspect="1" noMove="1" noResize="1" noEditPoints="1" noAdjustHandles="1" noChangeArrowheads="1" noChangeShapeType="1" noTextEdit="1"/>
+          </p:cNvSpPr>
+          <p:nvPr>
+            <p:extLst>
+              <p:ext uri="{386F3935-93C4-4BCD-93E2-E3B085C9AB24}">
+                <p16:designElem xmlns:p16="http://schemas.microsoft.com/office/powerpoint/2015/main" val="1"/>
+              </p:ext>
+            </p:extLst>
+          </p:nvPr>
+        </p:nvSpPr>
+        <p:spPr>
+          <a:xfrm>
+            <a:off x="419100" y="413053"/>
+            <a:ext cx="2616201" cy="6064596"/>
+          </a:xfrm>
+          <a:prstGeom prst="rect">
+            <a:avLst/>
+          </a:prstGeom>
+          <a:noFill/>
+          <a:ln w="6350">
+            <a:solidFill>
+              <a:schemeClr val="tx1">
+                <a:lumMod val="75000"/>
+                <a:lumOff val="25000"/>
+              </a:schemeClr>
+            </a:solidFill>
+          </a:ln>
+        </p:spPr>
+        <p:style>
+          <a:lnRef idx="2">
+            <a:schemeClr val="accent1">
+              <a:shade val="50000"/>
+            </a:schemeClr>
+          </a:lnRef>
+          <a:fillRef idx="1">
+            <a:schemeClr val="accent1"/>
+          </a:fillRef>
+          <a:effectRef idx="0">
+            <a:schemeClr val="accent1"/>
+          </a:effectRef>
+          <a:fontRef idx="minor">
+            <a:schemeClr val="lt1"/>
+          </a:fontRef>
+        </p:style>
+        <p:txBody>
+          <a:bodyPr rtlCol="0" anchor="ctr"/>
+          <a:lstStyle/>
+          <a:p>
+            <a:pPr algn="ctr"/>
+            <a:endParaRPr lang="en-US"/>
+          </a:p>
+        </p:txBody>
+      </p:sp>
+      <p:sp>
+        <p:nvSpPr>
+          <p:cNvPr id="2" name="Title 1">
+            <a:extLst>
+              <a:ext uri="{FF2B5EF4-FFF2-40B4-BE49-F238E27FC236}">
+                <a16:creationId xmlns:a16="http://schemas.microsoft.com/office/drawing/2014/main" id="{36E92577-C90D-4E7C-8394-5802BE6326DA}"/>
+              </a:ext>
+            </a:extLst>
+          </p:cNvPr>
+          <p:cNvSpPr>
+            <a:spLocks noGrp="1"/>
+          </p:cNvSpPr>
+          <p:nvPr>
+            <p:ph type="title"/>
+          </p:nvPr>
+        </p:nvSpPr>
+        <p:spPr>
+          <a:xfrm>
+            <a:off x="557720" y="612843"/>
+            <a:ext cx="2312480" cy="1499738"/>
+          </a:xfrm>
+        </p:spPr>
+        <p:txBody>
+          <a:bodyPr anchor="b">
+            <a:normAutofit/>
+          </a:bodyPr>
+          <a:lstStyle/>
+          <a:p>
+            <a:r>
+              <a:rPr lang="en-US" sz="2800"/>
+              <a:t>Java JDK 1.8</a:t>
+            </a:r>
+          </a:p>
+        </p:txBody>
+      </p:sp>
+      <p:sp>
+        <p:nvSpPr>
+          <p:cNvPr id="3" name="Content Placeholder 2">
+            <a:extLst>
+              <a:ext uri="{FF2B5EF4-FFF2-40B4-BE49-F238E27FC236}">
+                <a16:creationId xmlns:a16="http://schemas.microsoft.com/office/drawing/2014/main" id="{EF142FC6-FF35-45E0-9EE5-D9D999B8ED13}"/>
+              </a:ext>
+            </a:extLst>
+          </p:cNvPr>
+          <p:cNvSpPr>
+            <a:spLocks noGrp="1"/>
+          </p:cNvSpPr>
+          <p:nvPr>
+            <p:ph idx="1"/>
+          </p:nvPr>
+        </p:nvSpPr>
+        <p:spPr>
+          <a:xfrm>
+            <a:off x="557720" y="2149813"/>
+            <a:ext cx="2312479" cy="4295134"/>
+          </a:xfrm>
+        </p:spPr>
+        <p:txBody>
+          <a:bodyPr>
+            <a:normAutofit fontScale="92500" lnSpcReduction="10000"/>
+          </a:bodyPr>
+          <a:lstStyle/>
+          <a:p>
+            <a:r>
+              <a:rPr lang="en-US" sz="1600" dirty="0">
+                <a:solidFill>
+                  <a:schemeClr val="tx1">
+                    <a:lumMod val="85000"/>
+                    <a:lumOff val="15000"/>
+                  </a:schemeClr>
+                </a:solidFill>
+              </a:rPr>
+              <a:t>Download : </a:t>
+            </a:r>
+            <a:r>
+              <a:rPr lang="en-US" sz="1600" dirty="0">
+                <a:solidFill>
+                  <a:schemeClr val="tx1">
+                    <a:lumMod val="85000"/>
+                    <a:lumOff val="15000"/>
+                  </a:schemeClr>
+                </a:solidFill>
+                <a:hlinkClick r:id="rId2"/>
+              </a:rPr>
+              <a:t>https://www.oracle.com/technetwork/java/javase/downloads/jdk8-downloads-2133151.html</a:t>
+            </a:r>
+            <a:endParaRPr lang="en-US" sz="1600" dirty="0">
+              <a:solidFill>
+                <a:schemeClr val="tx1">
+                  <a:lumMod val="85000"/>
+                  <a:lumOff val="15000"/>
+                </a:schemeClr>
+              </a:solidFill>
+            </a:endParaRPr>
+          </a:p>
+          <a:p>
+            <a:r>
+              <a:rPr lang="th-TH" sz="2000" dirty="0">
+                <a:solidFill>
+                  <a:schemeClr val="tx1">
+                    <a:lumMod val="85000"/>
+                    <a:lumOff val="15000"/>
+                  </a:schemeClr>
+                </a:solidFill>
+              </a:rPr>
+              <a:t>ติ๊ก </a:t>
+            </a:r>
+            <a:r>
+              <a:rPr lang="en-US" sz="2000" dirty="0">
+                <a:solidFill>
+                  <a:schemeClr val="tx1">
+                    <a:lumMod val="85000"/>
+                    <a:lumOff val="15000"/>
+                  </a:schemeClr>
+                </a:solidFill>
+              </a:rPr>
+              <a:t>Accept License Agreement</a:t>
+            </a:r>
+            <a:endParaRPr lang="th-TH" sz="2000" dirty="0">
+              <a:solidFill>
+                <a:schemeClr val="tx1">
+                  <a:lumMod val="85000"/>
+                  <a:lumOff val="15000"/>
+                </a:schemeClr>
+              </a:solidFill>
+            </a:endParaRPr>
+          </a:p>
+          <a:p>
+            <a:r>
+              <a:rPr lang="th-TH" sz="2000" dirty="0">
+                <a:solidFill>
+                  <a:schemeClr val="tx1">
+                    <a:lumMod val="85000"/>
+                    <a:lumOff val="15000"/>
+                  </a:schemeClr>
+                </a:solidFill>
+              </a:rPr>
+              <a:t>กด </a:t>
+            </a:r>
+            <a:r>
+              <a:rPr lang="en-US" sz="2000" dirty="0">
+                <a:solidFill>
+                  <a:schemeClr val="tx1">
+                    <a:lumMod val="85000"/>
+                    <a:lumOff val="15000"/>
+                  </a:schemeClr>
+                </a:solidFill>
+              </a:rPr>
+              <a:t>Download</a:t>
+            </a:r>
+          </a:p>
+          <a:p>
+            <a:r>
+              <a:rPr lang="th-TH" sz="2000" dirty="0">
+                <a:solidFill>
+                  <a:schemeClr val="tx1">
+                    <a:lumMod val="85000"/>
+                    <a:lumOff val="15000"/>
+                  </a:schemeClr>
+                </a:solidFill>
+              </a:rPr>
+              <a:t>ทำการ </a:t>
+            </a:r>
+            <a:r>
+              <a:rPr lang="en-US" sz="2000" dirty="0">
+                <a:solidFill>
+                  <a:schemeClr val="tx1">
+                    <a:lumMod val="85000"/>
+                    <a:lumOff val="15000"/>
+                  </a:schemeClr>
+                </a:solidFill>
+              </a:rPr>
+              <a:t>setting environment </a:t>
+            </a:r>
+            <a:r>
+              <a:rPr lang="th-TH" sz="2000" dirty="0">
+                <a:solidFill>
+                  <a:schemeClr val="tx1">
+                    <a:lumMod val="85000"/>
+                    <a:lumOff val="15000"/>
+                  </a:schemeClr>
+                </a:solidFill>
+              </a:rPr>
+              <a:t>ตามลิงค์นี้ </a:t>
+            </a:r>
+            <a:r>
+              <a:rPr lang="en-US" sz="2000" dirty="0">
+                <a:solidFill>
+                  <a:schemeClr val="tx1">
+                    <a:lumMod val="85000"/>
+                    <a:lumOff val="15000"/>
+                  </a:schemeClr>
+                </a:solidFill>
+              </a:rPr>
+              <a:t>:</a:t>
+            </a:r>
+            <a:r>
+              <a:rPr lang="th-TH" sz="2000" dirty="0">
+                <a:solidFill>
+                  <a:schemeClr val="tx1">
+                    <a:lumMod val="85000"/>
+                    <a:lumOff val="15000"/>
+                  </a:schemeClr>
+                </a:solidFill>
+              </a:rPr>
+              <a:t> </a:t>
+            </a:r>
+            <a:r>
+              <a:rPr lang="en-US" sz="2000" dirty="0">
+                <a:hlinkClick r:id="rId3"/>
+              </a:rPr>
+              <a:t>https://www.mkyong.com/java/how-to-set-java_home-on-windows-10/</a:t>
+            </a:r>
+            <a:endParaRPr lang="en-US" sz="2000" dirty="0">
+              <a:solidFill>
+                <a:schemeClr val="tx1">
+                  <a:lumMod val="85000"/>
+                  <a:lumOff val="15000"/>
+                </a:schemeClr>
+              </a:solidFill>
+            </a:endParaRPr>
+          </a:p>
+          <a:p>
+            <a:endParaRPr lang="en-US" sz="1400" dirty="0">
+              <a:solidFill>
+                <a:schemeClr val="tx1">
+                  <a:lumMod val="85000"/>
+                  <a:lumOff val="15000"/>
+                </a:schemeClr>
+              </a:solidFill>
+            </a:endParaRPr>
+          </a:p>
+        </p:txBody>
+      </p:sp>
+      <p:sp>
+        <p:nvSpPr>
+          <p:cNvPr id="16" name="Rectangle 15">
+            <a:extLst>
+              <a:ext uri="{FF2B5EF4-FFF2-40B4-BE49-F238E27FC236}">
+                <a16:creationId xmlns:a16="http://schemas.microsoft.com/office/drawing/2014/main" id="{68DC0EC7-60EA-4BD3-BC04-D547DE1B2891}"/>
+              </a:ext>
+              <a:ext uri="{C183D7F6-B498-43B3-948B-1728B52AA6E4}">
+                <adec:decorative xmlns:adec="http://schemas.microsoft.com/office/drawing/2017/decorative" val="1"/>
+              </a:ext>
+            </a:extLst>
+          </p:cNvPr>
+          <p:cNvSpPr>
+            <a:spLocks noGrp="1" noRot="1" noChangeAspect="1" noMove="1" noResize="1" noEditPoints="1" noAdjustHandles="1" noChangeArrowheads="1" noChangeShapeType="1" noTextEdit="1"/>
+          </p:cNvSpPr>
+          <p:nvPr>
+            <p:extLst>
+              <p:ext uri="{386F3935-93C4-4BCD-93E2-E3B085C9AB24}">
+                <p16:designElem xmlns:p16="http://schemas.microsoft.com/office/powerpoint/2015/main" val="1"/>
+              </p:ext>
+            </p:extLst>
+          </p:nvPr>
+        </p:nvSpPr>
+        <p:spPr>
+          <a:xfrm>
+            <a:off x="3569764" y="413053"/>
+            <a:ext cx="8212114" cy="6064596"/>
+          </a:xfrm>
+          <a:prstGeom prst="rect">
+            <a:avLst/>
+          </a:prstGeom>
+          <a:noFill/>
+          <a:ln w="6350" cap="sq" cmpd="sng" algn="ctr">
+            <a:solidFill>
+              <a:srgbClr val="404040"/>
+            </a:solidFill>
+            <a:prstDash val="solid"/>
+            <a:miter lim="800000"/>
+          </a:ln>
+          <a:effectLst/>
+        </p:spPr>
+      </p:sp>
+      <p:pic>
+        <p:nvPicPr>
+          <p:cNvPr id="5" name="Picture 4" descr="A screenshot of a cell phone&#10;&#10;Description automatically generated">
+            <a:extLst>
+              <a:ext uri="{FF2B5EF4-FFF2-40B4-BE49-F238E27FC236}">
+                <a16:creationId xmlns:a16="http://schemas.microsoft.com/office/drawing/2014/main" id="{DABCC850-F8B8-4CC6-9293-DF15EE6D51AB}"/>
+              </a:ext>
+            </a:extLst>
+          </p:cNvPr>
+          <p:cNvPicPr>
+            <a:picLocks noChangeAspect="1"/>
+          </p:cNvPicPr>
+          <p:nvPr/>
+        </p:nvPicPr>
+        <p:blipFill>
+          <a:blip r:embed="rId4">
+            <a:extLst>
+              <a:ext uri="{28A0092B-C50C-407E-A947-70E740481C1C}">
+                <a14:useLocalDpi xmlns:a14="http://schemas.microsoft.com/office/drawing/2010/main" val="0"/>
+              </a:ext>
+            </a:extLst>
+          </a:blip>
+          <a:stretch>
+            <a:fillRect/>
+          </a:stretch>
+        </p:blipFill>
+        <p:spPr>
+          <a:xfrm>
+            <a:off x="4049422" y="1172320"/>
+            <a:ext cx="7237877" cy="4541767"/>
+          </a:xfrm>
+          <a:prstGeom prst="rect">
+            <a:avLst/>
+          </a:prstGeom>
+        </p:spPr>
+      </p:pic>
+    </p:spTree>
+    <p:extLst>
+      <p:ext uri="{BB962C8B-B14F-4D97-AF65-F5344CB8AC3E}">
+        <p14:creationId xmlns:p14="http://schemas.microsoft.com/office/powerpoint/2010/main" val="3067258830"/>
+      </p:ext>
+    </p:extLst>
+  </p:cSld>
+  <p:clrMapOvr>
+    <a:overrideClrMapping bg1="dk1" tx1="lt1" bg2="dk2" tx2="lt2" accent1="accent1" accent2="accent2" accent3="accent3" accent4="accent4" accent5="accent5" accent6="accent6" hlink="hlink" folHlink="folHlink"/>
   </p:clrMapOvr>
 </p:sld>
 </file>

</xml_diff>

<commit_message>
- edit presentation - initial project
</commit_message>
<xml_diff>
--- a/document/presentation.pptx
+++ b/document/presentation.pptx
@@ -12,6 +12,15 @@
     <p:sldId id="260" r:id="rId6"/>
     <p:sldId id="261" r:id="rId7"/>
     <p:sldId id="262" r:id="rId8"/>
+    <p:sldId id="263" r:id="rId9"/>
+    <p:sldId id="264" r:id="rId10"/>
+    <p:sldId id="265" r:id="rId11"/>
+    <p:sldId id="266" r:id="rId12"/>
+    <p:sldId id="267" r:id="rId13"/>
+    <p:sldId id="268" r:id="rId14"/>
+    <p:sldId id="269" r:id="rId15"/>
+    <p:sldId id="270" r:id="rId16"/>
+    <p:sldId id="271" r:id="rId17"/>
   </p:sldIdLst>
   <p:sldSz cx="12192000" cy="6858000"/>
   <p:notesSz cx="6858000" cy="9144000"/>
@@ -8278,6 +8287,713 @@
 </p:sld>
 </file>
 
+<file path=ppt/slides/slide10.xml><?xml version="1.0" encoding="utf-8"?>
+<p:sld xmlns:a="http://schemas.openxmlformats.org/drawingml/2006/main" xmlns:r="http://schemas.openxmlformats.org/officeDocument/2006/relationships" xmlns:p="http://schemas.openxmlformats.org/presentationml/2006/main">
+  <p:cSld>
+    <p:spTree>
+      <p:nvGrpSpPr>
+        <p:cNvPr id="1" name=""/>
+        <p:cNvGrpSpPr/>
+        <p:nvPr/>
+      </p:nvGrpSpPr>
+      <p:grpSpPr>
+        <a:xfrm>
+          <a:off x="0" y="0"/>
+          <a:ext cx="0" cy="0"/>
+          <a:chOff x="0" y="0"/>
+          <a:chExt cx="0" cy="0"/>
+        </a:xfrm>
+      </p:grpSpPr>
+      <p:sp>
+        <p:nvSpPr>
+          <p:cNvPr id="2" name="Title 1">
+            <a:extLst>
+              <a:ext uri="{FF2B5EF4-FFF2-40B4-BE49-F238E27FC236}">
+                <a16:creationId xmlns:a16="http://schemas.microsoft.com/office/drawing/2014/main" id="{2953D872-28D1-4275-8411-F3FD75D2B36A}"/>
+              </a:ext>
+            </a:extLst>
+          </p:cNvPr>
+          <p:cNvSpPr>
+            <a:spLocks noGrp="1"/>
+          </p:cNvSpPr>
+          <p:nvPr>
+            <p:ph type="title"/>
+          </p:nvPr>
+        </p:nvSpPr>
+        <p:spPr/>
+        <p:txBody>
+          <a:bodyPr/>
+          <a:lstStyle/>
+          <a:p>
+            <a:r>
+              <a:rPr lang="en-US" dirty="0"/>
+              <a:t>IDE</a:t>
+            </a:r>
+            <a:r>
+              <a:rPr lang="th-TH" dirty="0"/>
+              <a:t> </a:t>
+            </a:r>
+            <a:r>
+              <a:rPr lang="en-US" dirty="0"/>
+              <a:t>Setting</a:t>
+            </a:r>
+          </a:p>
+        </p:txBody>
+      </p:sp>
+      <p:pic>
+        <p:nvPicPr>
+          <p:cNvPr id="5" name="Content Placeholder 4" descr="A screenshot of a cell phone&#10;&#10;Description automatically generated">
+            <a:extLst>
+              <a:ext uri="{FF2B5EF4-FFF2-40B4-BE49-F238E27FC236}">
+                <a16:creationId xmlns:a16="http://schemas.microsoft.com/office/drawing/2014/main" id="{5F197D28-BD73-4D22-8B52-6D522074C720}"/>
+              </a:ext>
+            </a:extLst>
+          </p:cNvPr>
+          <p:cNvPicPr>
+            <a:picLocks noGrp="1" noChangeAspect="1"/>
+          </p:cNvPicPr>
+          <p:nvPr>
+            <p:ph idx="1"/>
+          </p:nvPr>
+        </p:nvPicPr>
+        <p:blipFill>
+          <a:blip r:embed="rId2">
+            <a:extLst>
+              <a:ext uri="{28A0092B-C50C-407E-A947-70E740481C1C}">
+                <a14:useLocalDpi xmlns:a14="http://schemas.microsoft.com/office/drawing/2010/main" val="0"/>
+              </a:ext>
+            </a:extLst>
+          </a:blip>
+          <a:stretch>
+            <a:fillRect/>
+          </a:stretch>
+        </p:blipFill>
+        <p:spPr>
+          <a:xfrm>
+            <a:off x="2906249" y="1766300"/>
+            <a:ext cx="6379502" cy="4449106"/>
+          </a:xfrm>
+        </p:spPr>
+      </p:pic>
+    </p:spTree>
+    <p:extLst>
+      <p:ext uri="{BB962C8B-B14F-4D97-AF65-F5344CB8AC3E}">
+        <p14:creationId xmlns:p14="http://schemas.microsoft.com/office/powerpoint/2010/main" val="1219944159"/>
+      </p:ext>
+    </p:extLst>
+  </p:cSld>
+  <p:clrMapOvr>
+    <a:masterClrMapping/>
+  </p:clrMapOvr>
+</p:sld>
+</file>
+
+<file path=ppt/slides/slide11.xml><?xml version="1.0" encoding="utf-8"?>
+<p:sld xmlns:a="http://schemas.openxmlformats.org/drawingml/2006/main" xmlns:r="http://schemas.openxmlformats.org/officeDocument/2006/relationships" xmlns:p="http://schemas.openxmlformats.org/presentationml/2006/main">
+  <p:cSld>
+    <p:spTree>
+      <p:nvGrpSpPr>
+        <p:cNvPr id="1" name=""/>
+        <p:cNvGrpSpPr/>
+        <p:nvPr/>
+      </p:nvGrpSpPr>
+      <p:grpSpPr>
+        <a:xfrm>
+          <a:off x="0" y="0"/>
+          <a:ext cx="0" cy="0"/>
+          <a:chOff x="0" y="0"/>
+          <a:chExt cx="0" cy="0"/>
+        </a:xfrm>
+      </p:grpSpPr>
+      <p:sp>
+        <p:nvSpPr>
+          <p:cNvPr id="2" name="Title 1">
+            <a:extLst>
+              <a:ext uri="{FF2B5EF4-FFF2-40B4-BE49-F238E27FC236}">
+                <a16:creationId xmlns:a16="http://schemas.microsoft.com/office/drawing/2014/main" id="{9E9FB170-79BD-42DB-B867-BF789597A8A0}"/>
+              </a:ext>
+            </a:extLst>
+          </p:cNvPr>
+          <p:cNvSpPr>
+            <a:spLocks noGrp="1"/>
+          </p:cNvSpPr>
+          <p:nvPr>
+            <p:ph type="title"/>
+          </p:nvPr>
+        </p:nvSpPr>
+        <p:spPr/>
+        <p:txBody>
+          <a:bodyPr/>
+          <a:lstStyle/>
+          <a:p>
+            <a:r>
+              <a:rPr lang="en-US" dirty="0"/>
+              <a:t>IDE</a:t>
+            </a:r>
+            <a:r>
+              <a:rPr lang="th-TH" dirty="0"/>
+              <a:t> </a:t>
+            </a:r>
+            <a:r>
+              <a:rPr lang="en-US" dirty="0"/>
+              <a:t>Setting</a:t>
+            </a:r>
+          </a:p>
+        </p:txBody>
+      </p:sp>
+      <p:pic>
+        <p:nvPicPr>
+          <p:cNvPr id="5" name="Content Placeholder 4" descr="A screenshot of a cell phone&#10;&#10;Description automatically generated">
+            <a:extLst>
+              <a:ext uri="{FF2B5EF4-FFF2-40B4-BE49-F238E27FC236}">
+                <a16:creationId xmlns:a16="http://schemas.microsoft.com/office/drawing/2014/main" id="{DAD80519-9146-4712-91E6-6222AD7F1840}"/>
+              </a:ext>
+            </a:extLst>
+          </p:cNvPr>
+          <p:cNvPicPr>
+            <a:picLocks noGrp="1" noChangeAspect="1"/>
+          </p:cNvPicPr>
+          <p:nvPr>
+            <p:ph idx="1"/>
+          </p:nvPr>
+        </p:nvPicPr>
+        <p:blipFill>
+          <a:blip r:embed="rId2">
+            <a:extLst>
+              <a:ext uri="{28A0092B-C50C-407E-A947-70E740481C1C}">
+                <a14:useLocalDpi xmlns:a14="http://schemas.microsoft.com/office/drawing/2010/main" val="0"/>
+              </a:ext>
+            </a:extLst>
+          </a:blip>
+          <a:stretch>
+            <a:fillRect/>
+          </a:stretch>
+        </p:blipFill>
+        <p:spPr>
+          <a:xfrm>
+            <a:off x="3362826" y="1678877"/>
+            <a:ext cx="5466348" cy="4868590"/>
+          </a:xfrm>
+        </p:spPr>
+      </p:pic>
+    </p:spTree>
+    <p:extLst>
+      <p:ext uri="{BB962C8B-B14F-4D97-AF65-F5344CB8AC3E}">
+        <p14:creationId xmlns:p14="http://schemas.microsoft.com/office/powerpoint/2010/main" val="1081771171"/>
+      </p:ext>
+    </p:extLst>
+  </p:cSld>
+  <p:clrMapOvr>
+    <a:masterClrMapping/>
+  </p:clrMapOvr>
+</p:sld>
+</file>
+
+<file path=ppt/slides/slide12.xml><?xml version="1.0" encoding="utf-8"?>
+<p:sld xmlns:a="http://schemas.openxmlformats.org/drawingml/2006/main" xmlns:r="http://schemas.openxmlformats.org/officeDocument/2006/relationships" xmlns:p="http://schemas.openxmlformats.org/presentationml/2006/main">
+  <p:cSld>
+    <p:spTree>
+      <p:nvGrpSpPr>
+        <p:cNvPr id="1" name=""/>
+        <p:cNvGrpSpPr/>
+        <p:nvPr/>
+      </p:nvGrpSpPr>
+      <p:grpSpPr>
+        <a:xfrm>
+          <a:off x="0" y="0"/>
+          <a:ext cx="0" cy="0"/>
+          <a:chOff x="0" y="0"/>
+          <a:chExt cx="0" cy="0"/>
+        </a:xfrm>
+      </p:grpSpPr>
+      <p:sp>
+        <p:nvSpPr>
+          <p:cNvPr id="2" name="Title 1">
+            <a:extLst>
+              <a:ext uri="{FF2B5EF4-FFF2-40B4-BE49-F238E27FC236}">
+                <a16:creationId xmlns:a16="http://schemas.microsoft.com/office/drawing/2014/main" id="{9573D64F-2B63-400C-B60B-DD33703EDB8D}"/>
+              </a:ext>
+            </a:extLst>
+          </p:cNvPr>
+          <p:cNvSpPr>
+            <a:spLocks noGrp="1"/>
+          </p:cNvSpPr>
+          <p:nvPr>
+            <p:ph type="title"/>
+          </p:nvPr>
+        </p:nvSpPr>
+        <p:spPr/>
+        <p:txBody>
+          <a:bodyPr/>
+          <a:lstStyle/>
+          <a:p>
+            <a:r>
+              <a:rPr lang="en-US" dirty="0"/>
+              <a:t>IDE</a:t>
+            </a:r>
+            <a:r>
+              <a:rPr lang="th-TH" dirty="0"/>
+              <a:t> </a:t>
+            </a:r>
+            <a:r>
+              <a:rPr lang="en-US" dirty="0"/>
+              <a:t>Setting</a:t>
+            </a:r>
+          </a:p>
+        </p:txBody>
+      </p:sp>
+      <p:pic>
+        <p:nvPicPr>
+          <p:cNvPr id="5" name="Content Placeholder 4" descr="A screenshot of a social media post&#10;&#10;Description automatically generated">
+            <a:extLst>
+              <a:ext uri="{FF2B5EF4-FFF2-40B4-BE49-F238E27FC236}">
+                <a16:creationId xmlns:a16="http://schemas.microsoft.com/office/drawing/2014/main" id="{BED57412-8BBA-4EF4-BFC2-96911AA47485}"/>
+              </a:ext>
+            </a:extLst>
+          </p:cNvPr>
+          <p:cNvPicPr>
+            <a:picLocks noGrp="1" noChangeAspect="1"/>
+          </p:cNvPicPr>
+          <p:nvPr>
+            <p:ph idx="1"/>
+          </p:nvPr>
+        </p:nvPicPr>
+        <p:blipFill>
+          <a:blip r:embed="rId2">
+            <a:extLst>
+              <a:ext uri="{28A0092B-C50C-407E-A947-70E740481C1C}">
+                <a14:useLocalDpi xmlns:a14="http://schemas.microsoft.com/office/drawing/2010/main" val="0"/>
+              </a:ext>
+            </a:extLst>
+          </a:blip>
+          <a:stretch>
+            <a:fillRect/>
+          </a:stretch>
+        </p:blipFill>
+        <p:spPr>
+          <a:xfrm>
+            <a:off x="2351614" y="1700556"/>
+            <a:ext cx="7488771" cy="4772025"/>
+          </a:xfrm>
+        </p:spPr>
+      </p:pic>
+    </p:spTree>
+    <p:extLst>
+      <p:ext uri="{BB962C8B-B14F-4D97-AF65-F5344CB8AC3E}">
+        <p14:creationId xmlns:p14="http://schemas.microsoft.com/office/powerpoint/2010/main" val="1796246199"/>
+      </p:ext>
+    </p:extLst>
+  </p:cSld>
+  <p:clrMapOvr>
+    <a:masterClrMapping/>
+  </p:clrMapOvr>
+</p:sld>
+</file>
+
+<file path=ppt/slides/slide13.xml><?xml version="1.0" encoding="utf-8"?>
+<p:sld xmlns:a="http://schemas.openxmlformats.org/drawingml/2006/main" xmlns:r="http://schemas.openxmlformats.org/officeDocument/2006/relationships" xmlns:p="http://schemas.openxmlformats.org/presentationml/2006/main">
+  <p:cSld>
+    <p:spTree>
+      <p:nvGrpSpPr>
+        <p:cNvPr id="1" name=""/>
+        <p:cNvGrpSpPr/>
+        <p:nvPr/>
+      </p:nvGrpSpPr>
+      <p:grpSpPr>
+        <a:xfrm>
+          <a:off x="0" y="0"/>
+          <a:ext cx="0" cy="0"/>
+          <a:chOff x="0" y="0"/>
+          <a:chExt cx="0" cy="0"/>
+        </a:xfrm>
+      </p:grpSpPr>
+      <p:sp>
+        <p:nvSpPr>
+          <p:cNvPr id="2" name="Title 1">
+            <a:extLst>
+              <a:ext uri="{FF2B5EF4-FFF2-40B4-BE49-F238E27FC236}">
+                <a16:creationId xmlns:a16="http://schemas.microsoft.com/office/drawing/2014/main" id="{1C93F65C-37B0-41AF-916A-3AD749C39B0F}"/>
+              </a:ext>
+            </a:extLst>
+          </p:cNvPr>
+          <p:cNvSpPr>
+            <a:spLocks noGrp="1"/>
+          </p:cNvSpPr>
+          <p:nvPr>
+            <p:ph type="title"/>
+          </p:nvPr>
+        </p:nvSpPr>
+        <p:spPr/>
+        <p:txBody>
+          <a:bodyPr/>
+          <a:lstStyle/>
+          <a:p>
+            <a:r>
+              <a:rPr lang="en-US" dirty="0"/>
+              <a:t>IDE</a:t>
+            </a:r>
+            <a:r>
+              <a:rPr lang="th-TH" dirty="0"/>
+              <a:t> </a:t>
+            </a:r>
+            <a:r>
+              <a:rPr lang="en-US" dirty="0"/>
+              <a:t>Setting</a:t>
+            </a:r>
+          </a:p>
+        </p:txBody>
+      </p:sp>
+      <p:pic>
+        <p:nvPicPr>
+          <p:cNvPr id="5" name="Content Placeholder 4" descr="A screenshot of a cell phone&#10;&#10;Description automatically generated">
+            <a:extLst>
+              <a:ext uri="{FF2B5EF4-FFF2-40B4-BE49-F238E27FC236}">
+                <a16:creationId xmlns:a16="http://schemas.microsoft.com/office/drawing/2014/main" id="{37A0469E-B590-461F-9803-82FBD9614A9E}"/>
+              </a:ext>
+            </a:extLst>
+          </p:cNvPr>
+          <p:cNvPicPr>
+            <a:picLocks noGrp="1" noChangeAspect="1"/>
+          </p:cNvPicPr>
+          <p:nvPr>
+            <p:ph idx="1"/>
+          </p:nvPr>
+        </p:nvPicPr>
+        <p:blipFill>
+          <a:blip r:embed="rId2">
+            <a:extLst>
+              <a:ext uri="{28A0092B-C50C-407E-A947-70E740481C1C}">
+                <a14:useLocalDpi xmlns:a14="http://schemas.microsoft.com/office/drawing/2010/main" val="0"/>
+              </a:ext>
+            </a:extLst>
+          </a:blip>
+          <a:stretch>
+            <a:fillRect/>
+          </a:stretch>
+        </p:blipFill>
+        <p:spPr>
+          <a:xfrm>
+            <a:off x="3535759" y="1714500"/>
+            <a:ext cx="5120481" cy="4615026"/>
+          </a:xfrm>
+        </p:spPr>
+      </p:pic>
+    </p:spTree>
+    <p:extLst>
+      <p:ext uri="{BB962C8B-B14F-4D97-AF65-F5344CB8AC3E}">
+        <p14:creationId xmlns:p14="http://schemas.microsoft.com/office/powerpoint/2010/main" val="1684846621"/>
+      </p:ext>
+    </p:extLst>
+  </p:cSld>
+  <p:clrMapOvr>
+    <a:masterClrMapping/>
+  </p:clrMapOvr>
+</p:sld>
+</file>
+
+<file path=ppt/slides/slide14.xml><?xml version="1.0" encoding="utf-8"?>
+<p:sld xmlns:a="http://schemas.openxmlformats.org/drawingml/2006/main" xmlns:r="http://schemas.openxmlformats.org/officeDocument/2006/relationships" xmlns:p="http://schemas.openxmlformats.org/presentationml/2006/main">
+  <p:cSld>
+    <p:spTree>
+      <p:nvGrpSpPr>
+        <p:cNvPr id="1" name=""/>
+        <p:cNvGrpSpPr/>
+        <p:nvPr/>
+      </p:nvGrpSpPr>
+      <p:grpSpPr>
+        <a:xfrm>
+          <a:off x="0" y="0"/>
+          <a:ext cx="0" cy="0"/>
+          <a:chOff x="0" y="0"/>
+          <a:chExt cx="0" cy="0"/>
+        </a:xfrm>
+      </p:grpSpPr>
+      <p:sp>
+        <p:nvSpPr>
+          <p:cNvPr id="2" name="Title 1">
+            <a:extLst>
+              <a:ext uri="{FF2B5EF4-FFF2-40B4-BE49-F238E27FC236}">
+                <a16:creationId xmlns:a16="http://schemas.microsoft.com/office/drawing/2014/main" id="{E42004D8-FC73-48A4-8621-D47CA8E63124}"/>
+              </a:ext>
+            </a:extLst>
+          </p:cNvPr>
+          <p:cNvSpPr>
+            <a:spLocks noGrp="1"/>
+          </p:cNvSpPr>
+          <p:nvPr>
+            <p:ph type="title"/>
+          </p:nvPr>
+        </p:nvSpPr>
+        <p:spPr/>
+        <p:txBody>
+          <a:bodyPr/>
+          <a:lstStyle/>
+          <a:p>
+            <a:r>
+              <a:rPr lang="en-US" dirty="0"/>
+              <a:t>IDE</a:t>
+            </a:r>
+            <a:r>
+              <a:rPr lang="th-TH" dirty="0"/>
+              <a:t> </a:t>
+            </a:r>
+            <a:r>
+              <a:rPr lang="en-US" dirty="0"/>
+              <a:t>Setting</a:t>
+            </a:r>
+          </a:p>
+        </p:txBody>
+      </p:sp>
+      <p:pic>
+        <p:nvPicPr>
+          <p:cNvPr id="5" name="Content Placeholder 4" descr="A screenshot of a cell phone&#10;&#10;Description automatically generated">
+            <a:extLst>
+              <a:ext uri="{FF2B5EF4-FFF2-40B4-BE49-F238E27FC236}">
+                <a16:creationId xmlns:a16="http://schemas.microsoft.com/office/drawing/2014/main" id="{97054323-5B11-4E68-BCE3-AC05718EBF7B}"/>
+              </a:ext>
+            </a:extLst>
+          </p:cNvPr>
+          <p:cNvPicPr>
+            <a:picLocks noGrp="1" noChangeAspect="1"/>
+          </p:cNvPicPr>
+          <p:nvPr>
+            <p:ph idx="1"/>
+          </p:nvPr>
+        </p:nvPicPr>
+        <p:blipFill>
+          <a:blip r:embed="rId2">
+            <a:extLst>
+              <a:ext uri="{28A0092B-C50C-407E-A947-70E740481C1C}">
+                <a14:useLocalDpi xmlns:a14="http://schemas.microsoft.com/office/drawing/2010/main" val="0"/>
+              </a:ext>
+            </a:extLst>
+          </a:blip>
+          <a:stretch>
+            <a:fillRect/>
+          </a:stretch>
+        </p:blipFill>
+        <p:spPr>
+          <a:xfrm>
+            <a:off x="3322097" y="1710081"/>
+            <a:ext cx="5547806" cy="4743450"/>
+          </a:xfrm>
+        </p:spPr>
+      </p:pic>
+    </p:spTree>
+    <p:extLst>
+      <p:ext uri="{BB962C8B-B14F-4D97-AF65-F5344CB8AC3E}">
+        <p14:creationId xmlns:p14="http://schemas.microsoft.com/office/powerpoint/2010/main" val="4181722949"/>
+      </p:ext>
+    </p:extLst>
+  </p:cSld>
+  <p:clrMapOvr>
+    <a:masterClrMapping/>
+  </p:clrMapOvr>
+</p:sld>
+</file>
+
+<file path=ppt/slides/slide15.xml><?xml version="1.0" encoding="utf-8"?>
+<p:sld xmlns:a="http://schemas.openxmlformats.org/drawingml/2006/main" xmlns:r="http://schemas.openxmlformats.org/officeDocument/2006/relationships" xmlns:p="http://schemas.openxmlformats.org/presentationml/2006/main">
+  <p:cSld>
+    <p:spTree>
+      <p:nvGrpSpPr>
+        <p:cNvPr id="1" name=""/>
+        <p:cNvGrpSpPr/>
+        <p:nvPr/>
+      </p:nvGrpSpPr>
+      <p:grpSpPr>
+        <a:xfrm>
+          <a:off x="0" y="0"/>
+          <a:ext cx="0" cy="0"/>
+          <a:chOff x="0" y="0"/>
+          <a:chExt cx="0" cy="0"/>
+        </a:xfrm>
+      </p:grpSpPr>
+      <p:sp>
+        <p:nvSpPr>
+          <p:cNvPr id="2" name="Title 1">
+            <a:extLst>
+              <a:ext uri="{FF2B5EF4-FFF2-40B4-BE49-F238E27FC236}">
+                <a16:creationId xmlns:a16="http://schemas.microsoft.com/office/drawing/2014/main" id="{3DB51012-5E30-426E-84DE-2722A027401D}"/>
+              </a:ext>
+            </a:extLst>
+          </p:cNvPr>
+          <p:cNvSpPr>
+            <a:spLocks noGrp="1"/>
+          </p:cNvSpPr>
+          <p:nvPr>
+            <p:ph type="title"/>
+          </p:nvPr>
+        </p:nvSpPr>
+        <p:spPr/>
+        <p:txBody>
+          <a:bodyPr/>
+          <a:lstStyle/>
+          <a:p>
+            <a:r>
+              <a:rPr lang="en-US" dirty="0"/>
+              <a:t>IDE</a:t>
+            </a:r>
+            <a:r>
+              <a:rPr lang="th-TH" dirty="0"/>
+              <a:t> </a:t>
+            </a:r>
+            <a:r>
+              <a:rPr lang="en-US" dirty="0"/>
+              <a:t>Setting</a:t>
+            </a:r>
+          </a:p>
+        </p:txBody>
+      </p:sp>
+      <p:pic>
+        <p:nvPicPr>
+          <p:cNvPr id="5" name="Content Placeholder 4" descr="A screenshot of a cell phone&#10;&#10;Description automatically generated">
+            <a:extLst>
+              <a:ext uri="{FF2B5EF4-FFF2-40B4-BE49-F238E27FC236}">
+                <a16:creationId xmlns:a16="http://schemas.microsoft.com/office/drawing/2014/main" id="{7F3325CF-4881-47F8-9730-D59810CFAACF}"/>
+              </a:ext>
+            </a:extLst>
+          </p:cNvPr>
+          <p:cNvPicPr>
+            <a:picLocks noGrp="1" noChangeAspect="1"/>
+          </p:cNvPicPr>
+          <p:nvPr>
+            <p:ph idx="1"/>
+          </p:nvPr>
+        </p:nvPicPr>
+        <p:blipFill>
+          <a:blip r:embed="rId2">
+            <a:extLst>
+              <a:ext uri="{28A0092B-C50C-407E-A947-70E740481C1C}">
+                <a14:useLocalDpi xmlns:a14="http://schemas.microsoft.com/office/drawing/2010/main" val="0"/>
+              </a:ext>
+            </a:extLst>
+          </a:blip>
+          <a:stretch>
+            <a:fillRect/>
+          </a:stretch>
+        </p:blipFill>
+        <p:spPr>
+          <a:xfrm>
+            <a:off x="3417457" y="1673560"/>
+            <a:ext cx="5357086" cy="4889166"/>
+          </a:xfrm>
+        </p:spPr>
+      </p:pic>
+    </p:spTree>
+    <p:extLst>
+      <p:ext uri="{BB962C8B-B14F-4D97-AF65-F5344CB8AC3E}">
+        <p14:creationId xmlns:p14="http://schemas.microsoft.com/office/powerpoint/2010/main" val="422835475"/>
+      </p:ext>
+    </p:extLst>
+  </p:cSld>
+  <p:clrMapOvr>
+    <a:masterClrMapping/>
+  </p:clrMapOvr>
+</p:sld>
+</file>
+
+<file path=ppt/slides/slide16.xml><?xml version="1.0" encoding="utf-8"?>
+<p:sld xmlns:a="http://schemas.openxmlformats.org/drawingml/2006/main" xmlns:r="http://schemas.openxmlformats.org/officeDocument/2006/relationships" xmlns:p="http://schemas.openxmlformats.org/presentationml/2006/main">
+  <p:cSld>
+    <p:spTree>
+      <p:nvGrpSpPr>
+        <p:cNvPr id="1" name=""/>
+        <p:cNvGrpSpPr/>
+        <p:nvPr/>
+      </p:nvGrpSpPr>
+      <p:grpSpPr>
+        <a:xfrm>
+          <a:off x="0" y="0"/>
+          <a:ext cx="0" cy="0"/>
+          <a:chOff x="0" y="0"/>
+          <a:chExt cx="0" cy="0"/>
+        </a:xfrm>
+      </p:grpSpPr>
+      <p:sp>
+        <p:nvSpPr>
+          <p:cNvPr id="2" name="Title 1">
+            <a:extLst>
+              <a:ext uri="{FF2B5EF4-FFF2-40B4-BE49-F238E27FC236}">
+                <a16:creationId xmlns:a16="http://schemas.microsoft.com/office/drawing/2014/main" id="{6EF3336B-46A1-49FB-A062-69645AAE2F6D}"/>
+              </a:ext>
+            </a:extLst>
+          </p:cNvPr>
+          <p:cNvSpPr>
+            <a:spLocks noGrp="1"/>
+          </p:cNvSpPr>
+          <p:nvPr>
+            <p:ph type="title"/>
+          </p:nvPr>
+        </p:nvSpPr>
+        <p:spPr/>
+        <p:txBody>
+          <a:bodyPr/>
+          <a:lstStyle/>
+          <a:p>
+            <a:r>
+              <a:rPr lang="en-US" dirty="0"/>
+              <a:t>IDE</a:t>
+            </a:r>
+            <a:r>
+              <a:rPr lang="th-TH" dirty="0"/>
+              <a:t> </a:t>
+            </a:r>
+            <a:r>
+              <a:rPr lang="en-US" dirty="0"/>
+              <a:t>Setting</a:t>
+            </a:r>
+          </a:p>
+        </p:txBody>
+      </p:sp>
+      <p:pic>
+        <p:nvPicPr>
+          <p:cNvPr id="5" name="Content Placeholder 4" descr="A screenshot of a cell phone&#10;&#10;Description automatically generated">
+            <a:extLst>
+              <a:ext uri="{FF2B5EF4-FFF2-40B4-BE49-F238E27FC236}">
+                <a16:creationId xmlns:a16="http://schemas.microsoft.com/office/drawing/2014/main" id="{DA57ED5A-E275-4A7B-986D-9316D244F3EE}"/>
+              </a:ext>
+            </a:extLst>
+          </p:cNvPr>
+          <p:cNvPicPr>
+            <a:picLocks noGrp="1" noChangeAspect="1"/>
+          </p:cNvPicPr>
+          <p:nvPr>
+            <p:ph idx="1"/>
+          </p:nvPr>
+        </p:nvPicPr>
+        <p:blipFill>
+          <a:blip r:embed="rId2">
+            <a:extLst>
+              <a:ext uri="{28A0092B-C50C-407E-A947-70E740481C1C}">
+                <a14:useLocalDpi xmlns:a14="http://schemas.microsoft.com/office/drawing/2010/main" val="0"/>
+              </a:ext>
+            </a:extLst>
+          </a:blip>
+          <a:stretch>
+            <a:fillRect/>
+          </a:stretch>
+        </p:blipFill>
+        <p:spPr>
+          <a:xfrm>
+            <a:off x="3625491" y="1637057"/>
+            <a:ext cx="4941018" cy="5049494"/>
+          </a:xfrm>
+        </p:spPr>
+      </p:pic>
+    </p:spTree>
+    <p:extLst>
+      <p:ext uri="{BB962C8B-B14F-4D97-AF65-F5344CB8AC3E}">
+        <p14:creationId xmlns:p14="http://schemas.microsoft.com/office/powerpoint/2010/main" val="4098549124"/>
+      </p:ext>
+    </p:extLst>
+  </p:cSld>
+  <p:clrMapOvr>
+    <a:masterClrMapping/>
+  </p:clrMapOvr>
+</p:sld>
+</file>
+
 <file path=ppt/slides/slide2.xml><?xml version="1.0" encoding="utf-8"?>
 <p:sld xmlns:a="http://schemas.openxmlformats.org/drawingml/2006/main" xmlns:r="http://schemas.openxmlformats.org/officeDocument/2006/relationships" xmlns:p="http://schemas.openxmlformats.org/presentationml/2006/main">
   <p:cSld>
@@ -10594,6 +11310,204 @@
   </p:cSld>
   <p:clrMapOvr>
     <a:overrideClrMapping bg1="dk1" tx1="lt1" bg2="dk2" tx2="lt2" accent1="accent1" accent2="accent2" accent3="accent3" accent4="accent4" accent5="accent5" accent6="accent6" hlink="hlink" folHlink="folHlink"/>
+  </p:clrMapOvr>
+</p:sld>
+</file>
+
+<file path=ppt/slides/slide8.xml><?xml version="1.0" encoding="utf-8"?>
+<p:sld xmlns:a="http://schemas.openxmlformats.org/drawingml/2006/main" xmlns:r="http://schemas.openxmlformats.org/officeDocument/2006/relationships" xmlns:p="http://schemas.openxmlformats.org/presentationml/2006/main">
+  <p:cSld>
+    <p:spTree>
+      <p:nvGrpSpPr>
+        <p:cNvPr id="1" name=""/>
+        <p:cNvGrpSpPr/>
+        <p:nvPr/>
+      </p:nvGrpSpPr>
+      <p:grpSpPr>
+        <a:xfrm>
+          <a:off x="0" y="0"/>
+          <a:ext cx="0" cy="0"/>
+          <a:chOff x="0" y="0"/>
+          <a:chExt cx="0" cy="0"/>
+        </a:xfrm>
+      </p:grpSpPr>
+      <p:sp>
+        <p:nvSpPr>
+          <p:cNvPr id="2" name="Title 1">
+            <a:extLst>
+              <a:ext uri="{FF2B5EF4-FFF2-40B4-BE49-F238E27FC236}">
+                <a16:creationId xmlns:a16="http://schemas.microsoft.com/office/drawing/2014/main" id="{036C7656-18D9-4223-A0FB-98C420BB44BC}"/>
+              </a:ext>
+            </a:extLst>
+          </p:cNvPr>
+          <p:cNvSpPr>
+            <a:spLocks noGrp="1"/>
+          </p:cNvSpPr>
+          <p:nvPr>
+            <p:ph type="title"/>
+          </p:nvPr>
+        </p:nvSpPr>
+        <p:spPr/>
+        <p:txBody>
+          <a:bodyPr/>
+          <a:lstStyle/>
+          <a:p>
+            <a:r>
+              <a:rPr lang="en-US" dirty="0"/>
+              <a:t>IDE</a:t>
+            </a:r>
+            <a:r>
+              <a:rPr lang="th-TH" dirty="0"/>
+              <a:t> </a:t>
+            </a:r>
+            <a:r>
+              <a:rPr lang="en-US" dirty="0"/>
+              <a:t>Setting</a:t>
+            </a:r>
+          </a:p>
+        </p:txBody>
+      </p:sp>
+      <p:pic>
+        <p:nvPicPr>
+          <p:cNvPr id="4" name="Content Placeholder 3">
+            <a:extLst>
+              <a:ext uri="{FF2B5EF4-FFF2-40B4-BE49-F238E27FC236}">
+                <a16:creationId xmlns:a16="http://schemas.microsoft.com/office/drawing/2014/main" id="{2C00A3CC-9474-40A1-8457-1DB4C5BC3038}"/>
+              </a:ext>
+            </a:extLst>
+          </p:cNvPr>
+          <p:cNvPicPr>
+            <a:picLocks noGrp="1" noChangeAspect="1"/>
+          </p:cNvPicPr>
+          <p:nvPr>
+            <p:ph idx="1"/>
+          </p:nvPr>
+        </p:nvPicPr>
+        <p:blipFill rotWithShape="1">
+          <a:blip r:embed="rId2"/>
+          <a:srcRect r="70180" b="71505"/>
+          <a:stretch/>
+        </p:blipFill>
+        <p:spPr>
+          <a:xfrm>
+            <a:off x="2612431" y="2014194"/>
+            <a:ext cx="6967138" cy="3744911"/>
+          </a:xfrm>
+          <a:prstGeom prst="rect">
+            <a:avLst/>
+          </a:prstGeom>
+        </p:spPr>
+      </p:pic>
+    </p:spTree>
+    <p:extLst>
+      <p:ext uri="{BB962C8B-B14F-4D97-AF65-F5344CB8AC3E}">
+        <p14:creationId xmlns:p14="http://schemas.microsoft.com/office/powerpoint/2010/main" val="4202683170"/>
+      </p:ext>
+    </p:extLst>
+  </p:cSld>
+  <p:clrMapOvr>
+    <a:masterClrMapping/>
+  </p:clrMapOvr>
+</p:sld>
+</file>
+
+<file path=ppt/slides/slide9.xml><?xml version="1.0" encoding="utf-8"?>
+<p:sld xmlns:a="http://schemas.openxmlformats.org/drawingml/2006/main" xmlns:r="http://schemas.openxmlformats.org/officeDocument/2006/relationships" xmlns:p="http://schemas.openxmlformats.org/presentationml/2006/main">
+  <p:cSld>
+    <p:spTree>
+      <p:nvGrpSpPr>
+        <p:cNvPr id="1" name=""/>
+        <p:cNvGrpSpPr/>
+        <p:nvPr/>
+      </p:nvGrpSpPr>
+      <p:grpSpPr>
+        <a:xfrm>
+          <a:off x="0" y="0"/>
+          <a:ext cx="0" cy="0"/>
+          <a:chOff x="0" y="0"/>
+          <a:chExt cx="0" cy="0"/>
+        </a:xfrm>
+      </p:grpSpPr>
+      <p:sp>
+        <p:nvSpPr>
+          <p:cNvPr id="2" name="Title 1">
+            <a:extLst>
+              <a:ext uri="{FF2B5EF4-FFF2-40B4-BE49-F238E27FC236}">
+                <a16:creationId xmlns:a16="http://schemas.microsoft.com/office/drawing/2014/main" id="{A0567B18-3F48-4260-9A4D-09316D183128}"/>
+              </a:ext>
+            </a:extLst>
+          </p:cNvPr>
+          <p:cNvSpPr>
+            <a:spLocks noGrp="1"/>
+          </p:cNvSpPr>
+          <p:nvPr>
+            <p:ph type="title"/>
+          </p:nvPr>
+        </p:nvSpPr>
+        <p:spPr/>
+        <p:txBody>
+          <a:bodyPr/>
+          <a:lstStyle/>
+          <a:p>
+            <a:r>
+              <a:rPr lang="en-US" dirty="0"/>
+              <a:t>IDE</a:t>
+            </a:r>
+            <a:r>
+              <a:rPr lang="th-TH" dirty="0"/>
+              <a:t> </a:t>
+            </a:r>
+            <a:r>
+              <a:rPr lang="en-US" dirty="0"/>
+              <a:t>Setting</a:t>
+            </a:r>
+          </a:p>
+        </p:txBody>
+      </p:sp>
+      <p:pic>
+        <p:nvPicPr>
+          <p:cNvPr id="5" name="Content Placeholder 4" descr="A screenshot of a cell phone&#10;&#10;Description automatically generated">
+            <a:extLst>
+              <a:ext uri="{FF2B5EF4-FFF2-40B4-BE49-F238E27FC236}">
+                <a16:creationId xmlns:a16="http://schemas.microsoft.com/office/drawing/2014/main" id="{6DF6589E-3417-4924-9FE4-D92F5A913333}"/>
+              </a:ext>
+            </a:extLst>
+          </p:cNvPr>
+          <p:cNvPicPr>
+            <a:picLocks noGrp="1" noChangeAspect="1"/>
+          </p:cNvPicPr>
+          <p:nvPr>
+            <p:ph idx="1"/>
+          </p:nvPr>
+        </p:nvPicPr>
+        <p:blipFill>
+          <a:blip r:embed="rId2">
+            <a:extLst>
+              <a:ext uri="{28A0092B-C50C-407E-A947-70E740481C1C}">
+                <a14:useLocalDpi xmlns:a14="http://schemas.microsoft.com/office/drawing/2010/main" val="0"/>
+              </a:ext>
+            </a:extLst>
+          </a:blip>
+          <a:stretch>
+            <a:fillRect/>
+          </a:stretch>
+        </p:blipFill>
+        <p:spPr>
+          <a:xfrm>
+            <a:off x="3311063" y="1671883"/>
+            <a:ext cx="5569873" cy="4734023"/>
+          </a:xfrm>
+        </p:spPr>
+      </p:pic>
+    </p:spTree>
+    <p:extLst>
+      <p:ext uri="{BB962C8B-B14F-4D97-AF65-F5344CB8AC3E}">
+        <p14:creationId xmlns:p14="http://schemas.microsoft.com/office/powerpoint/2010/main" val="1826275006"/>
+      </p:ext>
+    </p:extLst>
+  </p:cSld>
+  <p:clrMapOvr>
+    <a:masterClrMapping/>
   </p:clrMapOvr>
 </p:sld>
 </file>

</xml_diff>